<commit_message>
Monalco Value Driver tree updated, MVD profit
</commit_message>
<xml_diff>
--- a/Issue Tree and Value Driver Tree/Monalco Value Driver Tree [Tom Cheng] 11_19_2020.pptx
+++ b/Issue Tree and Value Driver Tree/Monalco Value Driver Tree [Tom Cheng] 11_19_2020.pptx
@@ -211,7 +211,7 @@
           <a:p>
             <a:fld id="{491C301B-90F2-4CA3-8018-7605EC3DFC73}" type="datetimeFigureOut">
               <a:rPr lang="en-US" smtClean="0"/>
-              <a:t>11/3/2020</a:t>
+              <a:t>11/23/2020</a:t>
             </a:fld>
             <a:endParaRPr lang="en-US"/>
           </a:p>
@@ -741,7 +741,7 @@
           <a:p>
             <a:fld id="{A89455EA-DB12-4D88-BD3B-086820814F37}" type="datetimeFigureOut">
               <a:rPr lang="en-US" smtClean="0"/>
-              <a:t>11/3/2020</a:t>
+              <a:t>11/23/2020</a:t>
             </a:fld>
             <a:endParaRPr lang="en-US"/>
           </a:p>
@@ -909,7 +909,7 @@
           <a:p>
             <a:fld id="{A89455EA-DB12-4D88-BD3B-086820814F37}" type="datetimeFigureOut">
               <a:rPr lang="en-US" smtClean="0"/>
-              <a:t>11/3/2020</a:t>
+              <a:t>11/23/2020</a:t>
             </a:fld>
             <a:endParaRPr lang="en-US"/>
           </a:p>
@@ -1087,7 +1087,7 @@
           <a:p>
             <a:fld id="{A89455EA-DB12-4D88-BD3B-086820814F37}" type="datetimeFigureOut">
               <a:rPr lang="en-US" smtClean="0"/>
-              <a:t>11/3/2020</a:t>
+              <a:t>11/23/2020</a:t>
             </a:fld>
             <a:endParaRPr lang="en-US"/>
           </a:p>
@@ -1255,7 +1255,7 @@
           <a:p>
             <a:fld id="{A89455EA-DB12-4D88-BD3B-086820814F37}" type="datetimeFigureOut">
               <a:rPr lang="en-US" smtClean="0"/>
-              <a:t>11/3/2020</a:t>
+              <a:t>11/23/2020</a:t>
             </a:fld>
             <a:endParaRPr lang="en-US"/>
           </a:p>
@@ -1500,7 +1500,7 @@
           <a:p>
             <a:fld id="{A89455EA-DB12-4D88-BD3B-086820814F37}" type="datetimeFigureOut">
               <a:rPr lang="en-US" smtClean="0"/>
-              <a:t>11/3/2020</a:t>
+              <a:t>11/23/2020</a:t>
             </a:fld>
             <a:endParaRPr lang="en-US"/>
           </a:p>
@@ -1785,7 +1785,7 @@
           <a:p>
             <a:fld id="{A89455EA-DB12-4D88-BD3B-086820814F37}" type="datetimeFigureOut">
               <a:rPr lang="en-US" smtClean="0"/>
-              <a:t>11/3/2020</a:t>
+              <a:t>11/23/2020</a:t>
             </a:fld>
             <a:endParaRPr lang="en-US"/>
           </a:p>
@@ -2204,7 +2204,7 @@
           <a:p>
             <a:fld id="{A89455EA-DB12-4D88-BD3B-086820814F37}" type="datetimeFigureOut">
               <a:rPr lang="en-US" smtClean="0"/>
-              <a:t>11/3/2020</a:t>
+              <a:t>11/23/2020</a:t>
             </a:fld>
             <a:endParaRPr lang="en-US"/>
           </a:p>
@@ -2415,7 +2415,7 @@
           <a:p>
             <a:fld id="{A89455EA-DB12-4D88-BD3B-086820814F37}" type="datetimeFigureOut">
               <a:rPr lang="en-US" smtClean="0"/>
-              <a:t>11/3/2020</a:t>
+              <a:t>11/23/2020</a:t>
             </a:fld>
             <a:endParaRPr lang="en-US"/>
           </a:p>
@@ -2510,7 +2510,7 @@
           <a:p>
             <a:fld id="{A89455EA-DB12-4D88-BD3B-086820814F37}" type="datetimeFigureOut">
               <a:rPr lang="en-US" smtClean="0"/>
-              <a:t>11/3/2020</a:t>
+              <a:t>11/23/2020</a:t>
             </a:fld>
             <a:endParaRPr lang="en-US"/>
           </a:p>
@@ -2785,7 +2785,7 @@
           <a:p>
             <a:fld id="{A89455EA-DB12-4D88-BD3B-086820814F37}" type="datetimeFigureOut">
               <a:rPr lang="en-US" smtClean="0"/>
-              <a:t>11/3/2020</a:t>
+              <a:t>11/23/2020</a:t>
             </a:fld>
             <a:endParaRPr lang="en-US"/>
           </a:p>
@@ -3037,7 +3037,7 @@
           <a:p>
             <a:fld id="{A89455EA-DB12-4D88-BD3B-086820814F37}" type="datetimeFigureOut">
               <a:rPr lang="en-US" smtClean="0"/>
-              <a:t>11/3/2020</a:t>
+              <a:t>11/23/2020</a:t>
             </a:fld>
             <a:endParaRPr lang="en-US"/>
           </a:p>
@@ -3248,7 +3248,7 @@
           <a:p>
             <a:fld id="{A89455EA-DB12-4D88-BD3B-086820814F37}" type="datetimeFigureOut">
               <a:rPr lang="en-US" smtClean="0"/>
-              <a:t>11/3/2020</a:t>
+              <a:t>11/23/2020</a:t>
             </a:fld>
             <a:endParaRPr lang="en-US"/>
           </a:p>
@@ -3632,7 +3632,7 @@
         <p:spPr>
           <a:xfrm>
             <a:off x="437536" y="3102792"/>
-            <a:ext cx="1391264" cy="533400"/>
+            <a:ext cx="867696" cy="533400"/>
           </a:xfrm>
           <a:prstGeom prst="rect">
             <a:avLst/>
@@ -3685,7 +3685,7 @@
                   <a:schemeClr val="bg1"/>
                 </a:solidFill>
               </a:rPr>
-              <a:t>Production Cost</a:t>
+              <a:t>Profit</a:t>
             </a:r>
           </a:p>
         </p:txBody>
@@ -3698,7 +3698,7 @@
         </p:nvSpPr>
         <p:spPr>
           <a:xfrm>
-            <a:off x="2717714" y="5349198"/>
+            <a:off x="2161868" y="4278633"/>
             <a:ext cx="1367589" cy="671599"/>
           </a:xfrm>
           <a:prstGeom prst="rect">
@@ -3751,7 +3751,7 @@
                   <a:schemeClr val="bg1"/>
                 </a:solidFill>
               </a:rPr>
-              <a:t>Tons of ore produced</a:t>
+              <a:t>Operation Costs</a:t>
             </a:r>
           </a:p>
         </p:txBody>
@@ -3764,8 +3764,8 @@
         </p:nvSpPr>
         <p:spPr>
           <a:xfrm>
-            <a:off x="2717715" y="2707223"/>
-            <a:ext cx="1473285" cy="369332"/>
+            <a:off x="2243957" y="1938923"/>
+            <a:ext cx="1108844" cy="380002"/>
           </a:xfrm>
           <a:prstGeom prst="rect">
             <a:avLst/>
@@ -3830,7 +3830,7 @@
         </p:nvSpPr>
         <p:spPr>
           <a:xfrm>
-            <a:off x="2717715" y="6020797"/>
+            <a:off x="2161868" y="4969195"/>
             <a:ext cx="1367589" cy="380003"/>
           </a:xfrm>
           <a:prstGeom prst="rect">
@@ -3883,7 +3883,7 @@
                   </a:schemeClr>
                 </a:solidFill>
               </a:rPr>
-              <a:t>ton</a:t>
+              <a:t>$</a:t>
             </a:r>
           </a:p>
         </p:txBody>
@@ -3896,8 +3896,8 @@
         </p:nvSpPr>
         <p:spPr>
           <a:xfrm>
-            <a:off x="2717715" y="2180046"/>
-            <a:ext cx="1473285" cy="533400"/>
+            <a:off x="2243958" y="1405523"/>
+            <a:ext cx="1108844" cy="533400"/>
           </a:xfrm>
           <a:prstGeom prst="rect">
             <a:avLst/>
@@ -3949,7 +3949,7 @@
                   <a:schemeClr val="bg1"/>
                 </a:solidFill>
               </a:rPr>
-              <a:t>Operational Cost</a:t>
+              <a:t>Revenue</a:t>
             </a:r>
           </a:p>
         </p:txBody>
@@ -3962,7 +3962,7 @@
         </p:nvSpPr>
         <p:spPr>
           <a:xfrm>
-            <a:off x="4952999" y="3353047"/>
+            <a:off x="4724399" y="3384557"/>
             <a:ext cx="1731639" cy="857126"/>
           </a:xfrm>
           <a:prstGeom prst="rect">
@@ -4015,7 +4015,7 @@
                   <a:schemeClr val="bg1"/>
                 </a:solidFill>
               </a:rPr>
-              <a:t>Variable Costs (maintenance, labor)</a:t>
+              <a:t>Variable Costs (e.g. labor)</a:t>
             </a:r>
           </a:p>
         </p:txBody>
@@ -4028,8 +4028,8 @@
         </p:nvSpPr>
         <p:spPr>
           <a:xfrm>
-            <a:off x="4953000" y="1322919"/>
-            <a:ext cx="3657600" cy="533400"/>
+            <a:off x="4404169" y="5437370"/>
+            <a:ext cx="1387031" cy="533400"/>
           </a:xfrm>
           <a:prstGeom prst="rect">
             <a:avLst/>
@@ -4081,23 +4081,7 @@
                   <a:schemeClr val="bg1"/>
                 </a:solidFill>
               </a:rPr>
-              <a:t>Fixed Costs (rent, insurance…</a:t>
-            </a:r>
-            <a:r>
-              <a:rPr lang="en-US" sz="2000" dirty="0" err="1">
-                <a:solidFill>
-                  <a:schemeClr val="bg1"/>
-                </a:solidFill>
-              </a:rPr>
-              <a:t>etc</a:t>
-            </a:r>
-            <a:r>
-              <a:rPr lang="en-US" sz="2000" dirty="0">
-                <a:solidFill>
-                  <a:schemeClr val="bg1"/>
-                </a:solidFill>
-              </a:rPr>
-              <a:t>)</a:t>
+              <a:t>Fixed Costs</a:t>
             </a:r>
           </a:p>
         </p:txBody>
@@ -4161,8 +4145,8 @@
         </p:nvSpPr>
         <p:spPr>
           <a:xfrm>
-            <a:off x="104468" y="2664543"/>
-            <a:ext cx="2057400" cy="369332"/>
+            <a:off x="104468" y="2381377"/>
+            <a:ext cx="1800532" cy="652498"/>
           </a:xfrm>
           <a:prstGeom prst="rect">
             <a:avLst/>
@@ -4183,90 +4167,6 @@
           </a:p>
         </p:txBody>
       </p:sp>
-      <p:cxnSp>
-        <p:nvCxnSpPr>
-          <p:cNvPr id="19" name="Connector: Elbow 18">
-            <a:extLst>
-              <a:ext uri="{FF2B5EF4-FFF2-40B4-BE49-F238E27FC236}">
-                <a16:creationId xmlns:a16="http://schemas.microsoft.com/office/drawing/2014/main" id="{E3E762EF-4EB6-4A42-BDCE-D8629EE1D79A}"/>
-              </a:ext>
-            </a:extLst>
-          </p:cNvPr>
-          <p:cNvCxnSpPr>
-            <a:cxnSpLocks/>
-            <a:stCxn id="2" idx="3"/>
-            <a:endCxn id="5" idx="1"/>
-          </p:cNvCxnSpPr>
-          <p:nvPr/>
-        </p:nvCxnSpPr>
-        <p:spPr>
-          <a:xfrm>
-            <a:off x="1828800" y="3369492"/>
-            <a:ext cx="888914" cy="2315506"/>
-          </a:xfrm>
-          <a:prstGeom prst="bentConnector3">
-            <a:avLst>
-              <a:gd name="adj1" fmla="val 50000"/>
-            </a:avLst>
-          </a:prstGeom>
-        </p:spPr>
-        <p:style>
-          <a:lnRef idx="1">
-            <a:schemeClr val="accent1"/>
-          </a:lnRef>
-          <a:fillRef idx="0">
-            <a:schemeClr val="accent1"/>
-          </a:fillRef>
-          <a:effectRef idx="0">
-            <a:schemeClr val="accent1"/>
-          </a:effectRef>
-          <a:fontRef idx="minor">
-            <a:schemeClr val="tx1"/>
-          </a:fontRef>
-        </p:style>
-      </p:cxnSp>
-      <p:cxnSp>
-        <p:nvCxnSpPr>
-          <p:cNvPr id="21" name="Connector: Elbow 20">
-            <a:extLst>
-              <a:ext uri="{FF2B5EF4-FFF2-40B4-BE49-F238E27FC236}">
-                <a16:creationId xmlns:a16="http://schemas.microsoft.com/office/drawing/2014/main" id="{6F995582-54BD-4098-9125-E6DE17CEB711}"/>
-              </a:ext>
-            </a:extLst>
-          </p:cNvPr>
-          <p:cNvCxnSpPr>
-            <a:cxnSpLocks/>
-            <a:stCxn id="2" idx="3"/>
-            <a:endCxn id="22" idx="1"/>
-          </p:cNvCxnSpPr>
-          <p:nvPr/>
-        </p:nvCxnSpPr>
-        <p:spPr>
-          <a:xfrm flipV="1">
-            <a:off x="1828800" y="2446746"/>
-            <a:ext cx="888915" cy="922746"/>
-          </a:xfrm>
-          <a:prstGeom prst="bentConnector3">
-            <a:avLst>
-              <a:gd name="adj1" fmla="val 50000"/>
-            </a:avLst>
-          </a:prstGeom>
-        </p:spPr>
-        <p:style>
-          <a:lnRef idx="1">
-            <a:schemeClr val="accent1"/>
-          </a:lnRef>
-          <a:fillRef idx="0">
-            <a:schemeClr val="accent1"/>
-          </a:fillRef>
-          <a:effectRef idx="0">
-            <a:schemeClr val="accent1"/>
-          </a:effectRef>
-          <a:fontRef idx="minor">
-            <a:schemeClr val="tx1"/>
-          </a:fontRef>
-        </p:style>
-      </p:cxnSp>
       <p:sp>
         <p:nvSpPr>
           <p:cNvPr id="50" name="Rectangle 49">
@@ -4281,8 +4181,8 @@
         </p:nvSpPr>
         <p:spPr>
           <a:xfrm>
-            <a:off x="4953000" y="1872764"/>
-            <a:ext cx="3657600" cy="533400"/>
+            <a:off x="4404169" y="5970770"/>
+            <a:ext cx="1387031" cy="393464"/>
           </a:xfrm>
           <a:prstGeom prst="rect">
             <a:avLst/>
@@ -4353,7 +4253,7 @@
         </p:nvSpPr>
         <p:spPr>
           <a:xfrm>
-            <a:off x="4952998" y="4224717"/>
+            <a:off x="4724401" y="4241683"/>
             <a:ext cx="1731637" cy="389716"/>
           </a:xfrm>
           <a:prstGeom prst="rect">
@@ -4411,12 +4311,940 @@
           </a:p>
         </p:txBody>
       </p:sp>
+      <p:sp>
+        <p:nvSpPr>
+          <p:cNvPr id="77" name="Rectangle 76">
+            <a:extLst>
+              <a:ext uri="{FF2B5EF4-FFF2-40B4-BE49-F238E27FC236}">
+                <a16:creationId xmlns:a16="http://schemas.microsoft.com/office/drawing/2014/main" id="{ED4F8AAB-FCA9-41E0-8545-465B1E5BD83A}"/>
+              </a:ext>
+            </a:extLst>
+          </p:cNvPr>
+          <p:cNvSpPr/>
+          <p:nvPr/>
+        </p:nvSpPr>
+        <p:spPr>
+          <a:xfrm>
+            <a:off x="7284340" y="2888436"/>
+            <a:ext cx="1554857" cy="583322"/>
+          </a:xfrm>
+          <a:prstGeom prst="rect">
+            <a:avLst/>
+          </a:prstGeom>
+          <a:gradFill flip="none" rotWithShape="1">
+            <a:gsLst>
+              <a:gs pos="40000">
+                <a:srgbClr val="0070C0"/>
+              </a:gs>
+              <a:gs pos="99000">
+                <a:srgbClr val="0070C0"/>
+              </a:gs>
+              <a:gs pos="0">
+                <a:srgbClr val="00B0F0"/>
+              </a:gs>
+            </a:gsLst>
+            <a:lin ang="4200000" scaled="0"/>
+            <a:tileRect/>
+          </a:gradFill>
+          <a:ln>
+            <a:solidFill>
+              <a:schemeClr val="accent1">
+                <a:lumMod val="75000"/>
+              </a:schemeClr>
+            </a:solidFill>
+          </a:ln>
+        </p:spPr>
+        <p:style>
+          <a:lnRef idx="1">
+            <a:schemeClr val="accent4"/>
+          </a:lnRef>
+          <a:fillRef idx="3">
+            <a:schemeClr val="accent4"/>
+          </a:fillRef>
+          <a:effectRef idx="2">
+            <a:schemeClr val="accent4"/>
+          </a:effectRef>
+          <a:fontRef idx="minor">
+            <a:schemeClr val="lt1"/>
+          </a:fontRef>
+        </p:style>
+        <p:txBody>
+          <a:bodyPr rtlCol="0" anchor="ctr"/>
+          <a:lstStyle/>
+          <a:p>
+            <a:r>
+              <a:rPr lang="en-US" sz="2000" dirty="0">
+                <a:solidFill>
+                  <a:schemeClr val="bg1"/>
+                </a:solidFill>
+              </a:rPr>
+              <a:t>Unit Variable Cost</a:t>
+            </a:r>
+          </a:p>
+        </p:txBody>
+      </p:sp>
+      <p:sp>
+        <p:nvSpPr>
+          <p:cNvPr id="79" name="Rectangle 78">
+            <a:extLst>
+              <a:ext uri="{FF2B5EF4-FFF2-40B4-BE49-F238E27FC236}">
+                <a16:creationId xmlns:a16="http://schemas.microsoft.com/office/drawing/2014/main" id="{CFF93891-467D-4C64-90F3-D721DA174656}"/>
+              </a:ext>
+            </a:extLst>
+          </p:cNvPr>
+          <p:cNvSpPr/>
+          <p:nvPr/>
+        </p:nvSpPr>
+        <p:spPr>
+          <a:xfrm>
+            <a:off x="437536" y="3662429"/>
+            <a:ext cx="867696" cy="369333"/>
+          </a:xfrm>
+          <a:prstGeom prst="rect">
+            <a:avLst/>
+          </a:prstGeom>
+          <a:gradFill>
+            <a:gsLst>
+              <a:gs pos="0">
+                <a:schemeClr val="bg1">
+                  <a:lumMod val="85000"/>
+                </a:schemeClr>
+              </a:gs>
+              <a:gs pos="100000">
+                <a:schemeClr val="bg1"/>
+              </a:gs>
+            </a:gsLst>
+          </a:gradFill>
+          <a:ln>
+            <a:solidFill>
+              <a:schemeClr val="bg1">
+                <a:lumMod val="50000"/>
+              </a:schemeClr>
+            </a:solidFill>
+          </a:ln>
+        </p:spPr>
+        <p:style>
+          <a:lnRef idx="1">
+            <a:schemeClr val="accent4"/>
+          </a:lnRef>
+          <a:fillRef idx="3">
+            <a:schemeClr val="accent4"/>
+          </a:fillRef>
+          <a:effectRef idx="2">
+            <a:schemeClr val="accent4"/>
+          </a:effectRef>
+          <a:fontRef idx="minor">
+            <a:schemeClr val="lt1"/>
+          </a:fontRef>
+        </p:style>
+        <p:txBody>
+          <a:bodyPr rtlCol="0" anchor="ctr"/>
+          <a:lstStyle/>
+          <a:p>
+            <a:r>
+              <a:rPr lang="en-US" sz="2000" dirty="0">
+                <a:solidFill>
+                  <a:schemeClr val="tx1">
+                    <a:lumMod val="75000"/>
+                    <a:lumOff val="25000"/>
+                  </a:schemeClr>
+                </a:solidFill>
+              </a:rPr>
+              <a:t>$</a:t>
+            </a:r>
+          </a:p>
+        </p:txBody>
+      </p:sp>
+      <p:sp>
+        <p:nvSpPr>
+          <p:cNvPr id="81" name="Rectangle 80">
+            <a:extLst>
+              <a:ext uri="{FF2B5EF4-FFF2-40B4-BE49-F238E27FC236}">
+                <a16:creationId xmlns:a16="http://schemas.microsoft.com/office/drawing/2014/main" id="{E0D86E1F-8355-478F-825B-473B230A28E5}"/>
+              </a:ext>
+            </a:extLst>
+          </p:cNvPr>
+          <p:cNvSpPr/>
+          <p:nvPr/>
+        </p:nvSpPr>
+        <p:spPr>
+          <a:xfrm>
+            <a:off x="7284340" y="3491294"/>
+            <a:ext cx="1554857" cy="367548"/>
+          </a:xfrm>
+          <a:prstGeom prst="rect">
+            <a:avLst/>
+          </a:prstGeom>
+          <a:gradFill>
+            <a:gsLst>
+              <a:gs pos="0">
+                <a:schemeClr val="bg1">
+                  <a:lumMod val="85000"/>
+                </a:schemeClr>
+              </a:gs>
+              <a:gs pos="100000">
+                <a:schemeClr val="bg1"/>
+              </a:gs>
+            </a:gsLst>
+          </a:gradFill>
+          <a:ln>
+            <a:solidFill>
+              <a:schemeClr val="bg1">
+                <a:lumMod val="50000"/>
+              </a:schemeClr>
+            </a:solidFill>
+          </a:ln>
+        </p:spPr>
+        <p:style>
+          <a:lnRef idx="1">
+            <a:schemeClr val="accent4"/>
+          </a:lnRef>
+          <a:fillRef idx="3">
+            <a:schemeClr val="accent4"/>
+          </a:fillRef>
+          <a:effectRef idx="2">
+            <a:schemeClr val="accent4"/>
+          </a:effectRef>
+          <a:fontRef idx="minor">
+            <a:schemeClr val="lt1"/>
+          </a:fontRef>
+        </p:style>
+        <p:txBody>
+          <a:bodyPr rtlCol="0" anchor="ctr"/>
+          <a:lstStyle/>
+          <a:p>
+            <a:r>
+              <a:rPr lang="en-US" sz="2000" dirty="0">
+                <a:solidFill>
+                  <a:schemeClr val="tx1">
+                    <a:lumMod val="75000"/>
+                    <a:lumOff val="25000"/>
+                  </a:schemeClr>
+                </a:solidFill>
+              </a:rPr>
+              <a:t>$ / Unit</a:t>
+            </a:r>
+          </a:p>
+        </p:txBody>
+      </p:sp>
+      <p:sp>
+        <p:nvSpPr>
+          <p:cNvPr id="85" name="Rectangle 84">
+            <a:extLst>
+              <a:ext uri="{FF2B5EF4-FFF2-40B4-BE49-F238E27FC236}">
+                <a16:creationId xmlns:a16="http://schemas.microsoft.com/office/drawing/2014/main" id="{4CA3D87C-E211-4F3D-9BB8-7AE5FEB68BF7}"/>
+              </a:ext>
+            </a:extLst>
+          </p:cNvPr>
+          <p:cNvSpPr/>
+          <p:nvPr/>
+        </p:nvSpPr>
+        <p:spPr>
+          <a:xfrm>
+            <a:off x="7263319" y="4029770"/>
+            <a:ext cx="1554857" cy="398966"/>
+          </a:xfrm>
+          <a:prstGeom prst="rect">
+            <a:avLst/>
+          </a:prstGeom>
+          <a:gradFill flip="none" rotWithShape="1">
+            <a:gsLst>
+              <a:gs pos="40000">
+                <a:srgbClr val="0070C0"/>
+              </a:gs>
+              <a:gs pos="99000">
+                <a:srgbClr val="0070C0"/>
+              </a:gs>
+              <a:gs pos="0">
+                <a:srgbClr val="00B0F0"/>
+              </a:gs>
+            </a:gsLst>
+            <a:lin ang="4200000" scaled="0"/>
+            <a:tileRect/>
+          </a:gradFill>
+          <a:ln>
+            <a:solidFill>
+              <a:schemeClr val="accent1">
+                <a:lumMod val="75000"/>
+              </a:schemeClr>
+            </a:solidFill>
+          </a:ln>
+        </p:spPr>
+        <p:style>
+          <a:lnRef idx="1">
+            <a:schemeClr val="accent4"/>
+          </a:lnRef>
+          <a:fillRef idx="3">
+            <a:schemeClr val="accent4"/>
+          </a:fillRef>
+          <a:effectRef idx="2">
+            <a:schemeClr val="accent4"/>
+          </a:effectRef>
+          <a:fontRef idx="minor">
+            <a:schemeClr val="lt1"/>
+          </a:fontRef>
+        </p:style>
+        <p:txBody>
+          <a:bodyPr rtlCol="0" anchor="ctr"/>
+          <a:lstStyle/>
+          <a:p>
+            <a:r>
+              <a:rPr lang="en-US" sz="2000" dirty="0">
+                <a:solidFill>
+                  <a:schemeClr val="bg1"/>
+                </a:solidFill>
+              </a:rPr>
+              <a:t># of Units</a:t>
+            </a:r>
+          </a:p>
+        </p:txBody>
+      </p:sp>
+      <p:sp>
+        <p:nvSpPr>
+          <p:cNvPr id="87" name="Rectangle 86">
+            <a:extLst>
+              <a:ext uri="{FF2B5EF4-FFF2-40B4-BE49-F238E27FC236}">
+                <a16:creationId xmlns:a16="http://schemas.microsoft.com/office/drawing/2014/main" id="{C3D25EED-40FE-4058-B6EA-5D11DFEFF125}"/>
+              </a:ext>
+            </a:extLst>
+          </p:cNvPr>
+          <p:cNvSpPr/>
+          <p:nvPr/>
+        </p:nvSpPr>
+        <p:spPr>
+          <a:xfrm>
+            <a:off x="7263319" y="4436998"/>
+            <a:ext cx="1554857" cy="380004"/>
+          </a:xfrm>
+          <a:prstGeom prst="rect">
+            <a:avLst/>
+          </a:prstGeom>
+          <a:gradFill>
+            <a:gsLst>
+              <a:gs pos="0">
+                <a:schemeClr val="bg1">
+                  <a:lumMod val="85000"/>
+                </a:schemeClr>
+              </a:gs>
+              <a:gs pos="100000">
+                <a:schemeClr val="bg1"/>
+              </a:gs>
+            </a:gsLst>
+          </a:gradFill>
+          <a:ln>
+            <a:solidFill>
+              <a:schemeClr val="bg1">
+                <a:lumMod val="50000"/>
+              </a:schemeClr>
+            </a:solidFill>
+          </a:ln>
+        </p:spPr>
+        <p:style>
+          <a:lnRef idx="1">
+            <a:schemeClr val="accent4"/>
+          </a:lnRef>
+          <a:fillRef idx="3">
+            <a:schemeClr val="accent4"/>
+          </a:fillRef>
+          <a:effectRef idx="2">
+            <a:schemeClr val="accent4"/>
+          </a:effectRef>
+          <a:fontRef idx="minor">
+            <a:schemeClr val="lt1"/>
+          </a:fontRef>
+        </p:style>
+        <p:txBody>
+          <a:bodyPr rtlCol="0" anchor="ctr"/>
+          <a:lstStyle/>
+          <a:p>
+            <a:r>
+              <a:rPr lang="en-US" sz="2000" dirty="0">
+                <a:solidFill>
+                  <a:schemeClr val="tx1">
+                    <a:lumMod val="75000"/>
+                    <a:lumOff val="25000"/>
+                  </a:schemeClr>
+                </a:solidFill>
+              </a:rPr>
+              <a:t># of Units</a:t>
+            </a:r>
+          </a:p>
+        </p:txBody>
+      </p:sp>
+      <p:sp>
+        <p:nvSpPr>
+          <p:cNvPr id="62" name="Rectangle 61">
+            <a:extLst>
+              <a:ext uri="{FF2B5EF4-FFF2-40B4-BE49-F238E27FC236}">
+                <a16:creationId xmlns:a16="http://schemas.microsoft.com/office/drawing/2014/main" id="{99054634-3C3B-400A-9D00-D4E3F27B17AF}"/>
+              </a:ext>
+            </a:extLst>
+          </p:cNvPr>
+          <p:cNvSpPr/>
+          <p:nvPr/>
+        </p:nvSpPr>
+        <p:spPr>
+          <a:xfrm>
+            <a:off x="4724400" y="1286922"/>
+            <a:ext cx="1960235" cy="465796"/>
+          </a:xfrm>
+          <a:prstGeom prst="rect">
+            <a:avLst/>
+          </a:prstGeom>
+          <a:gradFill flip="none" rotWithShape="1">
+            <a:gsLst>
+              <a:gs pos="40000">
+                <a:srgbClr val="0070C0"/>
+              </a:gs>
+              <a:gs pos="99000">
+                <a:srgbClr val="0070C0"/>
+              </a:gs>
+              <a:gs pos="0">
+                <a:srgbClr val="00B0F0"/>
+              </a:gs>
+            </a:gsLst>
+            <a:lin ang="4200000" scaled="0"/>
+            <a:tileRect/>
+          </a:gradFill>
+          <a:ln>
+            <a:solidFill>
+              <a:schemeClr val="accent1">
+                <a:lumMod val="75000"/>
+              </a:schemeClr>
+            </a:solidFill>
+          </a:ln>
+        </p:spPr>
+        <p:style>
+          <a:lnRef idx="1">
+            <a:schemeClr val="accent4"/>
+          </a:lnRef>
+          <a:fillRef idx="3">
+            <a:schemeClr val="accent4"/>
+          </a:fillRef>
+          <a:effectRef idx="2">
+            <a:schemeClr val="accent4"/>
+          </a:effectRef>
+          <a:fontRef idx="minor">
+            <a:schemeClr val="lt1"/>
+          </a:fontRef>
+        </p:style>
+        <p:txBody>
+          <a:bodyPr rtlCol="0" anchor="ctr"/>
+          <a:lstStyle/>
+          <a:p>
+            <a:r>
+              <a:rPr lang="en-US" sz="2000" dirty="0">
+                <a:solidFill>
+                  <a:schemeClr val="bg1"/>
+                </a:solidFill>
+              </a:rPr>
+              <a:t>Tons of ore sold</a:t>
+            </a:r>
+          </a:p>
+        </p:txBody>
+      </p:sp>
+      <p:sp>
+        <p:nvSpPr>
+          <p:cNvPr id="64" name="Rectangle 63">
+            <a:extLst>
+              <a:ext uri="{FF2B5EF4-FFF2-40B4-BE49-F238E27FC236}">
+                <a16:creationId xmlns:a16="http://schemas.microsoft.com/office/drawing/2014/main" id="{B5265362-C33A-4DA4-A841-E1E110A4434A}"/>
+              </a:ext>
+            </a:extLst>
+          </p:cNvPr>
+          <p:cNvSpPr/>
+          <p:nvPr/>
+        </p:nvSpPr>
+        <p:spPr>
+          <a:xfrm>
+            <a:off x="4724399" y="1761619"/>
+            <a:ext cx="1960235" cy="389717"/>
+          </a:xfrm>
+          <a:prstGeom prst="rect">
+            <a:avLst/>
+          </a:prstGeom>
+          <a:gradFill>
+            <a:gsLst>
+              <a:gs pos="0">
+                <a:schemeClr val="bg1">
+                  <a:lumMod val="85000"/>
+                </a:schemeClr>
+              </a:gs>
+              <a:gs pos="100000">
+                <a:schemeClr val="bg1"/>
+              </a:gs>
+            </a:gsLst>
+          </a:gradFill>
+          <a:ln>
+            <a:solidFill>
+              <a:schemeClr val="bg1">
+                <a:lumMod val="50000"/>
+              </a:schemeClr>
+            </a:solidFill>
+          </a:ln>
+        </p:spPr>
+        <p:style>
+          <a:lnRef idx="1">
+            <a:schemeClr val="accent4"/>
+          </a:lnRef>
+          <a:fillRef idx="3">
+            <a:schemeClr val="accent4"/>
+          </a:fillRef>
+          <a:effectRef idx="2">
+            <a:schemeClr val="accent4"/>
+          </a:effectRef>
+          <a:fontRef idx="minor">
+            <a:schemeClr val="lt1"/>
+          </a:fontRef>
+        </p:style>
+        <p:txBody>
+          <a:bodyPr rtlCol="0" anchor="ctr"/>
+          <a:lstStyle/>
+          <a:p>
+            <a:r>
+              <a:rPr lang="en-US" sz="2000" dirty="0">
+                <a:solidFill>
+                  <a:schemeClr val="tx1">
+                    <a:lumMod val="75000"/>
+                    <a:lumOff val="25000"/>
+                  </a:schemeClr>
+                </a:solidFill>
+              </a:rPr>
+              <a:t># of tons</a:t>
+            </a:r>
+          </a:p>
+        </p:txBody>
+      </p:sp>
+      <p:sp>
+        <p:nvSpPr>
+          <p:cNvPr id="65" name="Rectangle 64">
+            <a:extLst>
+              <a:ext uri="{FF2B5EF4-FFF2-40B4-BE49-F238E27FC236}">
+                <a16:creationId xmlns:a16="http://schemas.microsoft.com/office/drawing/2014/main" id="{983D7684-AA45-480C-955B-3145A6F0751A}"/>
+              </a:ext>
+            </a:extLst>
+          </p:cNvPr>
+          <p:cNvSpPr/>
+          <p:nvPr/>
+        </p:nvSpPr>
+        <p:spPr>
+          <a:xfrm>
+            <a:off x="4747464" y="2318002"/>
+            <a:ext cx="1960235" cy="465796"/>
+          </a:xfrm>
+          <a:prstGeom prst="rect">
+            <a:avLst/>
+          </a:prstGeom>
+          <a:gradFill flip="none" rotWithShape="1">
+            <a:gsLst>
+              <a:gs pos="40000">
+                <a:srgbClr val="0070C0"/>
+              </a:gs>
+              <a:gs pos="99000">
+                <a:srgbClr val="0070C0"/>
+              </a:gs>
+              <a:gs pos="0">
+                <a:srgbClr val="00B0F0"/>
+              </a:gs>
+            </a:gsLst>
+            <a:lin ang="4200000" scaled="0"/>
+            <a:tileRect/>
+          </a:gradFill>
+          <a:ln>
+            <a:solidFill>
+              <a:schemeClr val="accent1">
+                <a:lumMod val="75000"/>
+              </a:schemeClr>
+            </a:solidFill>
+          </a:ln>
+        </p:spPr>
+        <p:style>
+          <a:lnRef idx="1">
+            <a:schemeClr val="accent4"/>
+          </a:lnRef>
+          <a:fillRef idx="3">
+            <a:schemeClr val="accent4"/>
+          </a:fillRef>
+          <a:effectRef idx="2">
+            <a:schemeClr val="accent4"/>
+          </a:effectRef>
+          <a:fontRef idx="minor">
+            <a:schemeClr val="lt1"/>
+          </a:fontRef>
+        </p:style>
+        <p:txBody>
+          <a:bodyPr rtlCol="0" anchor="ctr"/>
+          <a:lstStyle/>
+          <a:p>
+            <a:r>
+              <a:rPr lang="en-US" sz="2000" dirty="0">
+                <a:solidFill>
+                  <a:schemeClr val="bg1"/>
+                </a:solidFill>
+              </a:rPr>
+              <a:t>Price per Ton</a:t>
+            </a:r>
+          </a:p>
+        </p:txBody>
+      </p:sp>
+      <p:sp>
+        <p:nvSpPr>
+          <p:cNvPr id="66" name="Rectangle 65">
+            <a:extLst>
+              <a:ext uri="{FF2B5EF4-FFF2-40B4-BE49-F238E27FC236}">
+                <a16:creationId xmlns:a16="http://schemas.microsoft.com/office/drawing/2014/main" id="{F85BB4B2-62D7-4572-B1BB-03C7DFCD1E76}"/>
+              </a:ext>
+            </a:extLst>
+          </p:cNvPr>
+          <p:cNvSpPr/>
+          <p:nvPr/>
+        </p:nvSpPr>
+        <p:spPr>
+          <a:xfrm>
+            <a:off x="4750092" y="2795158"/>
+            <a:ext cx="1960235" cy="389717"/>
+          </a:xfrm>
+          <a:prstGeom prst="rect">
+            <a:avLst/>
+          </a:prstGeom>
+          <a:gradFill>
+            <a:gsLst>
+              <a:gs pos="0">
+                <a:schemeClr val="bg1">
+                  <a:lumMod val="85000"/>
+                </a:schemeClr>
+              </a:gs>
+              <a:gs pos="100000">
+                <a:schemeClr val="bg1"/>
+              </a:gs>
+            </a:gsLst>
+          </a:gradFill>
+          <a:ln>
+            <a:solidFill>
+              <a:schemeClr val="bg1">
+                <a:lumMod val="50000"/>
+              </a:schemeClr>
+            </a:solidFill>
+          </a:ln>
+        </p:spPr>
+        <p:style>
+          <a:lnRef idx="1">
+            <a:schemeClr val="accent4"/>
+          </a:lnRef>
+          <a:fillRef idx="3">
+            <a:schemeClr val="accent4"/>
+          </a:fillRef>
+          <a:effectRef idx="2">
+            <a:schemeClr val="accent4"/>
+          </a:effectRef>
+          <a:fontRef idx="minor">
+            <a:schemeClr val="lt1"/>
+          </a:fontRef>
+        </p:style>
+        <p:txBody>
+          <a:bodyPr rtlCol="0" anchor="ctr"/>
+          <a:lstStyle/>
+          <a:p>
+            <a:r>
+              <a:rPr lang="en-US" sz="2000" dirty="0">
+                <a:solidFill>
+                  <a:schemeClr val="tx1">
+                    <a:lumMod val="75000"/>
+                    <a:lumOff val="25000"/>
+                  </a:schemeClr>
+                </a:solidFill>
+              </a:rPr>
+              <a:t>$/Ton</a:t>
+            </a:r>
+          </a:p>
+        </p:txBody>
+      </p:sp>
+      <p:cxnSp>
+        <p:nvCxnSpPr>
+          <p:cNvPr id="35" name="Connector: Elbow 34">
+            <a:extLst>
+              <a:ext uri="{FF2B5EF4-FFF2-40B4-BE49-F238E27FC236}">
+                <a16:creationId xmlns:a16="http://schemas.microsoft.com/office/drawing/2014/main" id="{BC4CA175-1EF4-4790-B8BB-B9ABF181D017}"/>
+              </a:ext>
+            </a:extLst>
+          </p:cNvPr>
+          <p:cNvCxnSpPr>
+            <a:stCxn id="2" idx="3"/>
+            <a:endCxn id="5" idx="1"/>
+          </p:cNvCxnSpPr>
+          <p:nvPr/>
+        </p:nvCxnSpPr>
+        <p:spPr>
+          <a:xfrm>
+            <a:off x="1305232" y="3369492"/>
+            <a:ext cx="856636" cy="1244941"/>
+          </a:xfrm>
+          <a:prstGeom prst="bentConnector3">
+            <a:avLst>
+              <a:gd name="adj1" fmla="val 55521"/>
+            </a:avLst>
+          </a:prstGeom>
+        </p:spPr>
+        <p:style>
+          <a:lnRef idx="1">
+            <a:schemeClr val="accent2"/>
+          </a:lnRef>
+          <a:fillRef idx="0">
+            <a:schemeClr val="accent2"/>
+          </a:fillRef>
+          <a:effectRef idx="0">
+            <a:schemeClr val="accent2"/>
+          </a:effectRef>
+          <a:fontRef idx="minor">
+            <a:schemeClr val="tx1"/>
+          </a:fontRef>
+        </p:style>
+      </p:cxnSp>
+      <p:cxnSp>
+        <p:nvCxnSpPr>
+          <p:cNvPr id="37" name="Connector: Elbow 36">
+            <a:extLst>
+              <a:ext uri="{FF2B5EF4-FFF2-40B4-BE49-F238E27FC236}">
+                <a16:creationId xmlns:a16="http://schemas.microsoft.com/office/drawing/2014/main" id="{3591901D-98E6-4329-B15F-794A10BB7B88}"/>
+              </a:ext>
+            </a:extLst>
+          </p:cNvPr>
+          <p:cNvCxnSpPr>
+            <a:stCxn id="22" idx="3"/>
+            <a:endCxn id="62" idx="1"/>
+          </p:cNvCxnSpPr>
+          <p:nvPr/>
+        </p:nvCxnSpPr>
+        <p:spPr>
+          <a:xfrm flipV="1">
+            <a:off x="3352802" y="1519820"/>
+            <a:ext cx="1371598" cy="152403"/>
+          </a:xfrm>
+          <a:prstGeom prst="bentConnector3">
+            <a:avLst/>
+          </a:prstGeom>
+        </p:spPr>
+        <p:style>
+          <a:lnRef idx="1">
+            <a:schemeClr val="dk1"/>
+          </a:lnRef>
+          <a:fillRef idx="0">
+            <a:schemeClr val="dk1"/>
+          </a:fillRef>
+          <a:effectRef idx="0">
+            <a:schemeClr val="dk1"/>
+          </a:effectRef>
+          <a:fontRef idx="minor">
+            <a:schemeClr val="tx1"/>
+          </a:fontRef>
+        </p:style>
+      </p:cxnSp>
+      <p:cxnSp>
+        <p:nvCxnSpPr>
+          <p:cNvPr id="40" name="Connector: Elbow 39">
+            <a:extLst>
+              <a:ext uri="{FF2B5EF4-FFF2-40B4-BE49-F238E27FC236}">
+                <a16:creationId xmlns:a16="http://schemas.microsoft.com/office/drawing/2014/main" id="{4E6B71D1-C38F-4FB5-97D3-F7D749500EDC}"/>
+              </a:ext>
+            </a:extLst>
+          </p:cNvPr>
+          <p:cNvCxnSpPr>
+            <a:stCxn id="22" idx="3"/>
+            <a:endCxn id="65" idx="1"/>
+          </p:cNvCxnSpPr>
+          <p:nvPr/>
+        </p:nvCxnSpPr>
+        <p:spPr>
+          <a:xfrm>
+            <a:off x="3352802" y="1672223"/>
+            <a:ext cx="1394662" cy="878677"/>
+          </a:xfrm>
+          <a:prstGeom prst="bentConnector3">
+            <a:avLst>
+              <a:gd name="adj1" fmla="val 48870"/>
+            </a:avLst>
+          </a:prstGeom>
+        </p:spPr>
+        <p:style>
+          <a:lnRef idx="1">
+            <a:schemeClr val="dk1"/>
+          </a:lnRef>
+          <a:fillRef idx="0">
+            <a:schemeClr val="dk1"/>
+          </a:fillRef>
+          <a:effectRef idx="0">
+            <a:schemeClr val="dk1"/>
+          </a:effectRef>
+          <a:fontRef idx="minor">
+            <a:schemeClr val="tx1"/>
+          </a:fontRef>
+        </p:style>
+      </p:cxnSp>
+      <p:cxnSp>
+        <p:nvCxnSpPr>
+          <p:cNvPr id="42" name="Connector: Elbow 41">
+            <a:extLst>
+              <a:ext uri="{FF2B5EF4-FFF2-40B4-BE49-F238E27FC236}">
+                <a16:creationId xmlns:a16="http://schemas.microsoft.com/office/drawing/2014/main" id="{4DA31155-9BE6-46A9-969D-49055D18F808}"/>
+              </a:ext>
+            </a:extLst>
+          </p:cNvPr>
+          <p:cNvCxnSpPr>
+            <a:stCxn id="5" idx="3"/>
+            <a:endCxn id="23" idx="1"/>
+          </p:cNvCxnSpPr>
+          <p:nvPr/>
+        </p:nvCxnSpPr>
+        <p:spPr>
+          <a:xfrm flipV="1">
+            <a:off x="3529457" y="3813120"/>
+            <a:ext cx="1194942" cy="801313"/>
+          </a:xfrm>
+          <a:prstGeom prst="bentConnector3">
+            <a:avLst>
+              <a:gd name="adj1" fmla="val 36806"/>
+            </a:avLst>
+          </a:prstGeom>
+        </p:spPr>
+        <p:style>
+          <a:lnRef idx="1">
+            <a:schemeClr val="dk1"/>
+          </a:lnRef>
+          <a:fillRef idx="0">
+            <a:schemeClr val="dk1"/>
+          </a:fillRef>
+          <a:effectRef idx="0">
+            <a:schemeClr val="dk1"/>
+          </a:effectRef>
+          <a:fontRef idx="minor">
+            <a:schemeClr val="tx1"/>
+          </a:fontRef>
+        </p:style>
+      </p:cxnSp>
+      <p:cxnSp>
+        <p:nvCxnSpPr>
+          <p:cNvPr id="44" name="Connector: Elbow 43">
+            <a:extLst>
+              <a:ext uri="{FF2B5EF4-FFF2-40B4-BE49-F238E27FC236}">
+                <a16:creationId xmlns:a16="http://schemas.microsoft.com/office/drawing/2014/main" id="{695B56A7-E948-41A3-9F8F-79AD9F2A3982}"/>
+              </a:ext>
+            </a:extLst>
+          </p:cNvPr>
+          <p:cNvCxnSpPr>
+            <a:cxnSpLocks/>
+            <a:stCxn id="5" idx="3"/>
+            <a:endCxn id="24" idx="1"/>
+          </p:cNvCxnSpPr>
+          <p:nvPr/>
+        </p:nvCxnSpPr>
+        <p:spPr>
+          <a:xfrm>
+            <a:off x="3529457" y="4614433"/>
+            <a:ext cx="874712" cy="1089637"/>
+          </a:xfrm>
+          <a:prstGeom prst="bentConnector3">
+            <a:avLst/>
+          </a:prstGeom>
+        </p:spPr>
+        <p:style>
+          <a:lnRef idx="1">
+            <a:schemeClr val="dk1"/>
+          </a:lnRef>
+          <a:fillRef idx="0">
+            <a:schemeClr val="dk1"/>
+          </a:fillRef>
+          <a:effectRef idx="0">
+            <a:schemeClr val="dk1"/>
+          </a:effectRef>
+          <a:fontRef idx="minor">
+            <a:schemeClr val="tx1"/>
+          </a:fontRef>
+        </p:style>
+      </p:cxnSp>
+      <p:cxnSp>
+        <p:nvCxnSpPr>
+          <p:cNvPr id="46" name="Connector: Elbow 45">
+            <a:extLst>
+              <a:ext uri="{FF2B5EF4-FFF2-40B4-BE49-F238E27FC236}">
+                <a16:creationId xmlns:a16="http://schemas.microsoft.com/office/drawing/2014/main" id="{BF91A215-5484-4FD9-B5EC-9503FC128FCB}"/>
+              </a:ext>
+            </a:extLst>
+          </p:cNvPr>
+          <p:cNvCxnSpPr>
+            <a:stCxn id="23" idx="3"/>
+            <a:endCxn id="77" idx="1"/>
+          </p:cNvCxnSpPr>
+          <p:nvPr/>
+        </p:nvCxnSpPr>
+        <p:spPr>
+          <a:xfrm flipV="1">
+            <a:off x="6456038" y="3180097"/>
+            <a:ext cx="828302" cy="633023"/>
+          </a:xfrm>
+          <a:prstGeom prst="bentConnector3">
+            <a:avLst/>
+          </a:prstGeom>
+        </p:spPr>
+        <p:style>
+          <a:lnRef idx="1">
+            <a:schemeClr val="dk1"/>
+          </a:lnRef>
+          <a:fillRef idx="0">
+            <a:schemeClr val="dk1"/>
+          </a:fillRef>
+          <a:effectRef idx="0">
+            <a:schemeClr val="dk1"/>
+          </a:effectRef>
+          <a:fontRef idx="minor">
+            <a:schemeClr val="tx1"/>
+          </a:fontRef>
+        </p:style>
+      </p:cxnSp>
+      <p:cxnSp>
+        <p:nvCxnSpPr>
+          <p:cNvPr id="48" name="Connector: Elbow 47">
+            <a:extLst>
+              <a:ext uri="{FF2B5EF4-FFF2-40B4-BE49-F238E27FC236}">
+                <a16:creationId xmlns:a16="http://schemas.microsoft.com/office/drawing/2014/main" id="{DF82ACCE-72CC-49FF-9D33-0AE729C37EBF}"/>
+              </a:ext>
+            </a:extLst>
+          </p:cNvPr>
+          <p:cNvCxnSpPr>
+            <a:stCxn id="23" idx="3"/>
+            <a:endCxn id="85" idx="1"/>
+          </p:cNvCxnSpPr>
+          <p:nvPr/>
+        </p:nvCxnSpPr>
+        <p:spPr>
+          <a:xfrm>
+            <a:off x="6456038" y="3813120"/>
+            <a:ext cx="807281" cy="416133"/>
+          </a:xfrm>
+          <a:prstGeom prst="bentConnector3">
+            <a:avLst/>
+          </a:prstGeom>
+        </p:spPr>
+        <p:style>
+          <a:lnRef idx="1">
+            <a:schemeClr val="dk1"/>
+          </a:lnRef>
+          <a:fillRef idx="0">
+            <a:schemeClr val="dk1"/>
+          </a:fillRef>
+          <a:effectRef idx="0">
+            <a:schemeClr val="dk1"/>
+          </a:effectRef>
+          <a:fontRef idx="minor">
+            <a:schemeClr val="tx1"/>
+          </a:fontRef>
+        </p:style>
+      </p:cxnSp>
       <p:grpSp>
         <p:nvGrpSpPr>
-          <p:cNvPr id="57" name="Google Shape;39;p1">
+          <p:cNvPr id="88" name="Google Shape;39;p1">
             <a:extLst>
               <a:ext uri="{FF2B5EF4-FFF2-40B4-BE49-F238E27FC236}">
-                <a16:creationId xmlns:a16="http://schemas.microsoft.com/office/drawing/2014/main" id="{B2659D6E-8FF9-44B6-AD70-E05E6B2DF412}"/>
+                <a16:creationId xmlns:a16="http://schemas.microsoft.com/office/drawing/2014/main" id="{5DA92AAD-129F-439F-A2E4-FF653B5443F2}"/>
               </a:ext>
             </a:extLst>
           </p:cNvPr>
@@ -4425,7 +5253,7 @@
         </p:nvGrpSpPr>
         <p:grpSpPr>
           <a:xfrm rot="2796882">
-            <a:off x="2123325" y="3203359"/>
+            <a:off x="6751475" y="3652085"/>
             <a:ext cx="326880" cy="332266"/>
             <a:chOff x="4283114" y="-597224"/>
             <a:chExt cx="170332" cy="170332"/>
@@ -4433,10 +5261,10 @@
         </p:grpSpPr>
         <p:sp>
           <p:nvSpPr>
-            <p:cNvPr id="58" name="Google Shape;40;p1">
+            <p:cNvPr id="90" name="Google Shape;40;p1">
               <a:extLst>
                 <a:ext uri="{FF2B5EF4-FFF2-40B4-BE49-F238E27FC236}">
-                  <a16:creationId xmlns:a16="http://schemas.microsoft.com/office/drawing/2014/main" id="{5AC1EC71-86F4-46DC-97ED-3FE6330E5F64}"/>
+                  <a16:creationId xmlns:a16="http://schemas.microsoft.com/office/drawing/2014/main" id="{E127447D-A747-4947-8246-C796C16D3EEC}"/>
                 </a:ext>
               </a:extLst>
             </p:cNvPr>
@@ -4487,7 +5315,7 @@
                 <a:buFont typeface="Arial"/>
                 <a:buNone/>
               </a:pPr>
-              <a:endParaRPr sz="1428" b="1" i="0" u="none" strike="noStrike" cap="none" dirty="0">
+              <a:endParaRPr sz="1428" b="1" i="0" u="none" strike="noStrike" cap="none">
                 <a:solidFill>
                   <a:srgbClr val="000000"/>
                 </a:solidFill>
@@ -4501,10 +5329,209 @@
         </p:sp>
         <p:sp>
           <p:nvSpPr>
-            <p:cNvPr id="59" name="Google Shape;41;p1">
+            <p:cNvPr id="91" name="Google Shape;41;p1">
               <a:extLst>
                 <a:ext uri="{FF2B5EF4-FFF2-40B4-BE49-F238E27FC236}">
-                  <a16:creationId xmlns:a16="http://schemas.microsoft.com/office/drawing/2014/main" id="{408050FD-E272-4BF3-95F4-01E1606C5137}"/>
+                  <a16:creationId xmlns:a16="http://schemas.microsoft.com/office/drawing/2014/main" id="{38C0F913-09DC-40C0-A38D-D3F387F4EF2B}"/>
+                </a:ext>
+              </a:extLst>
+            </p:cNvPr>
+            <p:cNvSpPr/>
+            <p:nvPr/>
+          </p:nvSpPr>
+          <p:spPr>
+            <a:xfrm>
+              <a:off x="4308743" y="-571595"/>
+              <a:ext cx="119073" cy="119073"/>
+            </a:xfrm>
+            <a:custGeom>
+              <a:avLst/>
+              <a:gdLst/>
+              <a:ahLst/>
+              <a:cxnLst/>
+              <a:rect l="l" t="t" r="r" b="b"/>
+              <a:pathLst>
+                <a:path w="204" h="204" extrusionOk="0">
+                  <a:moveTo>
+                    <a:pt x="83" y="0"/>
+                  </a:moveTo>
+                  <a:lnTo>
+                    <a:pt x="119" y="0"/>
+                  </a:lnTo>
+                  <a:lnTo>
+                    <a:pt x="119" y="83"/>
+                  </a:lnTo>
+                  <a:lnTo>
+                    <a:pt x="204" y="83"/>
+                  </a:lnTo>
+                  <a:lnTo>
+                    <a:pt x="204" y="119"/>
+                  </a:lnTo>
+                  <a:lnTo>
+                    <a:pt x="119" y="119"/>
+                  </a:lnTo>
+                  <a:lnTo>
+                    <a:pt x="119" y="204"/>
+                  </a:lnTo>
+                  <a:lnTo>
+                    <a:pt x="83" y="204"/>
+                  </a:lnTo>
+                  <a:lnTo>
+                    <a:pt x="83" y="119"/>
+                  </a:lnTo>
+                  <a:lnTo>
+                    <a:pt x="0" y="119"/>
+                  </a:lnTo>
+                  <a:lnTo>
+                    <a:pt x="0" y="83"/>
+                  </a:lnTo>
+                  <a:lnTo>
+                    <a:pt x="83" y="83"/>
+                  </a:lnTo>
+                  <a:lnTo>
+                    <a:pt x="83" y="0"/>
+                  </a:lnTo>
+                  <a:close/>
+                </a:path>
+              </a:pathLst>
+            </a:custGeom>
+            <a:solidFill>
+              <a:schemeClr val="dk2"/>
+            </a:solidFill>
+            <a:ln>
+              <a:noFill/>
+            </a:ln>
+          </p:spPr>
+          <p:txBody>
+            <a:bodyPr spcFirstLastPara="1" wrap="square" lIns="93275" tIns="46625" rIns="93275" bIns="46625" anchor="t" anchorCtr="0">
+              <a:noAutofit/>
+            </a:bodyPr>
+            <a:lstStyle/>
+            <a:p>
+              <a:pPr marL="0" marR="0" lvl="0" indent="0" algn="l" rtl="0">
+                <a:lnSpc>
+                  <a:spcPct val="100000"/>
+                </a:lnSpc>
+                <a:spcBef>
+                  <a:spcPts val="0"/>
+                </a:spcBef>
+                <a:spcAft>
+                  <a:spcPts val="0"/>
+                </a:spcAft>
+                <a:buClr>
+                  <a:srgbClr val="000000"/>
+                </a:buClr>
+                <a:buSzPts val="1428"/>
+                <a:buFont typeface="Arial"/>
+                <a:buNone/>
+              </a:pPr>
+              <a:endParaRPr sz="1428" b="0" i="0" u="none" strike="noStrike" cap="none">
+                <a:solidFill>
+                  <a:srgbClr val="000000"/>
+                </a:solidFill>
+                <a:latin typeface="Arial"/>
+                <a:ea typeface="Arial"/>
+                <a:cs typeface="Arial"/>
+                <a:sym typeface="Arial"/>
+              </a:endParaRPr>
+            </a:p>
+          </p:txBody>
+        </p:sp>
+      </p:grpSp>
+      <p:grpSp>
+        <p:nvGrpSpPr>
+          <p:cNvPr id="92" name="Google Shape;39;p1">
+            <a:extLst>
+              <a:ext uri="{FF2B5EF4-FFF2-40B4-BE49-F238E27FC236}">
+                <a16:creationId xmlns:a16="http://schemas.microsoft.com/office/drawing/2014/main" id="{2489CC38-DD7C-4C73-B110-6EC30F58B5EF}"/>
+              </a:ext>
+            </a:extLst>
+          </p:cNvPr>
+          <p:cNvGrpSpPr/>
+          <p:nvPr/>
+        </p:nvGrpSpPr>
+        <p:grpSpPr>
+          <a:xfrm rot="2796882">
+            <a:off x="3895083" y="1506090"/>
+            <a:ext cx="326880" cy="332266"/>
+            <a:chOff x="4283114" y="-597224"/>
+            <a:chExt cx="170332" cy="170332"/>
+          </a:xfrm>
+        </p:grpSpPr>
+        <p:sp>
+          <p:nvSpPr>
+            <p:cNvPr id="94" name="Google Shape;40;p1">
+              <a:extLst>
+                <a:ext uri="{FF2B5EF4-FFF2-40B4-BE49-F238E27FC236}">
+                  <a16:creationId xmlns:a16="http://schemas.microsoft.com/office/drawing/2014/main" id="{1B86B194-F171-400E-96B0-8859B60688D4}"/>
+                </a:ext>
+              </a:extLst>
+            </p:cNvPr>
+            <p:cNvSpPr/>
+            <p:nvPr/>
+          </p:nvSpPr>
+          <p:spPr>
+            <a:xfrm>
+              <a:off x="4283114" y="-597224"/>
+              <a:ext cx="170332" cy="170332"/>
+            </a:xfrm>
+            <a:prstGeom prst="ellipse">
+              <a:avLst/>
+            </a:prstGeom>
+            <a:solidFill>
+              <a:schemeClr val="accent3"/>
+            </a:solidFill>
+            <a:ln w="12700" cap="flat" cmpd="sng">
+              <a:solidFill>
+                <a:schemeClr val="lt1"/>
+              </a:solidFill>
+              <a:prstDash val="solid"/>
+              <a:round/>
+              <a:headEnd type="none" w="sm" len="sm"/>
+              <a:tailEnd type="none" w="sm" len="sm"/>
+            </a:ln>
+          </p:spPr>
+          <p:txBody>
+            <a:bodyPr spcFirstLastPara="1" wrap="square" lIns="91425" tIns="45700" rIns="91425" bIns="45700" anchor="ctr" anchorCtr="0">
+              <a:noAutofit/>
+            </a:bodyPr>
+            <a:lstStyle/>
+            <a:p>
+              <a:pPr marL="0" marR="0" lvl="0" indent="0" algn="l" rtl="0">
+                <a:lnSpc>
+                  <a:spcPct val="100000"/>
+                </a:lnSpc>
+                <a:spcBef>
+                  <a:spcPts val="0"/>
+                </a:spcBef>
+                <a:spcAft>
+                  <a:spcPts val="0"/>
+                </a:spcAft>
+                <a:buClr>
+                  <a:srgbClr val="000000"/>
+                </a:buClr>
+                <a:buSzPts val="1428"/>
+                <a:buFont typeface="Arial"/>
+                <a:buNone/>
+              </a:pPr>
+              <a:endParaRPr sz="1428" b="1" i="0" u="none" strike="noStrike" cap="none">
+                <a:solidFill>
+                  <a:srgbClr val="000000"/>
+                </a:solidFill>
+                <a:latin typeface="Arial"/>
+                <a:ea typeface="Arial"/>
+                <a:cs typeface="Arial"/>
+                <a:sym typeface="Arial"/>
+              </a:endParaRPr>
+            </a:p>
+          </p:txBody>
+        </p:sp>
+        <p:sp>
+          <p:nvSpPr>
+            <p:cNvPr id="95" name="Google Shape;41;p1">
+              <a:extLst>
+                <a:ext uri="{FF2B5EF4-FFF2-40B4-BE49-F238E27FC236}">
+                  <a16:creationId xmlns:a16="http://schemas.microsoft.com/office/drawing/2014/main" id="{DC4F3434-9AA0-4A8B-8272-D4B07EC5E166}"/>
                 </a:ext>
               </a:extLst>
             </p:cNvPr>
@@ -4612,71 +5639,26 @@
       </p:grpSp>
       <p:cxnSp>
         <p:nvCxnSpPr>
-          <p:cNvPr id="63" name="Connector: Elbow 62">
+          <p:cNvPr id="60" name="Connector: Elbow 59">
             <a:extLst>
               <a:ext uri="{FF2B5EF4-FFF2-40B4-BE49-F238E27FC236}">
-                <a16:creationId xmlns:a16="http://schemas.microsoft.com/office/drawing/2014/main" id="{90747040-E121-480C-A32A-D82DA3B614D4}"/>
+                <a16:creationId xmlns:a16="http://schemas.microsoft.com/office/drawing/2014/main" id="{4E17CACF-732E-45E8-BEDB-84B46E20278C}"/>
               </a:ext>
             </a:extLst>
           </p:cNvPr>
           <p:cNvCxnSpPr>
-            <a:cxnSpLocks/>
-            <a:stCxn id="22" idx="3"/>
-            <a:endCxn id="24" idx="1"/>
+            <a:stCxn id="2" idx="3"/>
+            <a:endCxn id="22" idx="1"/>
           </p:cNvCxnSpPr>
           <p:nvPr/>
         </p:nvCxnSpPr>
         <p:spPr>
           <a:xfrm flipV="1">
-            <a:off x="4191000" y="1589619"/>
-            <a:ext cx="762000" cy="857127"/>
+            <a:off x="1305232" y="1672223"/>
+            <a:ext cx="938726" cy="1697269"/>
           </a:xfrm>
           <a:prstGeom prst="bentConnector3">
-            <a:avLst>
-              <a:gd name="adj1" fmla="val 50000"/>
-            </a:avLst>
-          </a:prstGeom>
-        </p:spPr>
-        <p:style>
-          <a:lnRef idx="1">
-            <a:schemeClr val="accent1"/>
-          </a:lnRef>
-          <a:fillRef idx="0">
-            <a:schemeClr val="accent1"/>
-          </a:fillRef>
-          <a:effectRef idx="0">
-            <a:schemeClr val="accent1"/>
-          </a:effectRef>
-          <a:fontRef idx="minor">
-            <a:schemeClr val="tx1"/>
-          </a:fontRef>
-        </p:style>
-      </p:cxnSp>
-      <p:cxnSp>
-        <p:nvCxnSpPr>
-          <p:cNvPr id="72" name="Connector: Elbow 71">
-            <a:extLst>
-              <a:ext uri="{FF2B5EF4-FFF2-40B4-BE49-F238E27FC236}">
-                <a16:creationId xmlns:a16="http://schemas.microsoft.com/office/drawing/2014/main" id="{3047F45B-C1F5-4F42-AE25-B39CA4433640}"/>
-              </a:ext>
-            </a:extLst>
-          </p:cNvPr>
-          <p:cNvCxnSpPr>
-            <a:cxnSpLocks/>
-            <a:stCxn id="22" idx="3"/>
-            <a:endCxn id="23" idx="1"/>
-          </p:cNvCxnSpPr>
-          <p:nvPr/>
-        </p:nvCxnSpPr>
-        <p:spPr>
-          <a:xfrm>
-            <a:off x="4191000" y="2446746"/>
-            <a:ext cx="761999" cy="1334864"/>
-          </a:xfrm>
-          <a:prstGeom prst="bentConnector3">
-            <a:avLst>
-              <a:gd name="adj1" fmla="val 50000"/>
-            </a:avLst>
+            <a:avLst/>
           </a:prstGeom>
         </p:spPr>
         <p:style>
@@ -4696,10 +5678,10 @@
       </p:cxnSp>
       <p:grpSp>
         <p:nvGrpSpPr>
-          <p:cNvPr id="73" name="Google Shape;39;p1">
+          <p:cNvPr id="96" name="Google Shape;39;p1">
             <a:extLst>
               <a:ext uri="{FF2B5EF4-FFF2-40B4-BE49-F238E27FC236}">
-                <a16:creationId xmlns:a16="http://schemas.microsoft.com/office/drawing/2014/main" id="{71730EDC-04D5-49D4-94DF-B7BF0C730E6A}"/>
+                <a16:creationId xmlns:a16="http://schemas.microsoft.com/office/drawing/2014/main" id="{C673E6E2-E62F-4924-82FD-14383A27A59A}"/>
               </a:ext>
             </a:extLst>
           </p:cNvPr>
@@ -4707,8 +5689,8 @@
           <p:nvPr/>
         </p:nvGrpSpPr>
         <p:grpSpPr>
-          <a:xfrm rot="2796882">
-            <a:off x="4408560" y="2280613"/>
+          <a:xfrm rot="5400000">
+            <a:off x="3815876" y="4450095"/>
             <a:ext cx="326880" cy="332266"/>
             <a:chOff x="4283114" y="-597224"/>
             <a:chExt cx="170332" cy="170332"/>
@@ -4716,10 +5698,10 @@
         </p:grpSpPr>
         <p:sp>
           <p:nvSpPr>
-            <p:cNvPr id="74" name="Google Shape;40;p1">
+            <p:cNvPr id="97" name="Google Shape;40;p1">
               <a:extLst>
                 <a:ext uri="{FF2B5EF4-FFF2-40B4-BE49-F238E27FC236}">
-                  <a16:creationId xmlns:a16="http://schemas.microsoft.com/office/drawing/2014/main" id="{D19F762B-00B2-46A0-A3EF-44F5B8423CE8}"/>
+                  <a16:creationId xmlns:a16="http://schemas.microsoft.com/office/drawing/2014/main" id="{A835E9A1-B457-4A9D-8514-A39E18CB7702}"/>
                 </a:ext>
               </a:extLst>
             </p:cNvPr>
@@ -4784,651 +5766,10 @@
         </p:sp>
         <p:sp>
           <p:nvSpPr>
-            <p:cNvPr id="75" name="Google Shape;41;p1">
+            <p:cNvPr id="98" name="Google Shape;41;p1">
               <a:extLst>
                 <a:ext uri="{FF2B5EF4-FFF2-40B4-BE49-F238E27FC236}">
-                  <a16:creationId xmlns:a16="http://schemas.microsoft.com/office/drawing/2014/main" id="{DF04AAA0-262C-4651-B7E8-913335F9B4AF}"/>
-                </a:ext>
-              </a:extLst>
-            </p:cNvPr>
-            <p:cNvSpPr/>
-            <p:nvPr/>
-          </p:nvSpPr>
-          <p:spPr>
-            <a:xfrm rot="2603118">
-              <a:off x="4308743" y="-571595"/>
-              <a:ext cx="119073" cy="119073"/>
-            </a:xfrm>
-            <a:custGeom>
-              <a:avLst/>
-              <a:gdLst/>
-              <a:ahLst/>
-              <a:cxnLst/>
-              <a:rect l="l" t="t" r="r" b="b"/>
-              <a:pathLst>
-                <a:path w="204" h="204" extrusionOk="0">
-                  <a:moveTo>
-                    <a:pt x="83" y="0"/>
-                  </a:moveTo>
-                  <a:lnTo>
-                    <a:pt x="119" y="0"/>
-                  </a:lnTo>
-                  <a:lnTo>
-                    <a:pt x="119" y="83"/>
-                  </a:lnTo>
-                  <a:lnTo>
-                    <a:pt x="204" y="83"/>
-                  </a:lnTo>
-                  <a:lnTo>
-                    <a:pt x="204" y="119"/>
-                  </a:lnTo>
-                  <a:lnTo>
-                    <a:pt x="119" y="119"/>
-                  </a:lnTo>
-                  <a:lnTo>
-                    <a:pt x="119" y="204"/>
-                  </a:lnTo>
-                  <a:lnTo>
-                    <a:pt x="83" y="204"/>
-                  </a:lnTo>
-                  <a:lnTo>
-                    <a:pt x="83" y="119"/>
-                  </a:lnTo>
-                  <a:lnTo>
-                    <a:pt x="0" y="119"/>
-                  </a:lnTo>
-                  <a:lnTo>
-                    <a:pt x="0" y="83"/>
-                  </a:lnTo>
-                  <a:lnTo>
-                    <a:pt x="83" y="83"/>
-                  </a:lnTo>
-                  <a:lnTo>
-                    <a:pt x="83" y="0"/>
-                  </a:lnTo>
-                  <a:close/>
-                </a:path>
-              </a:pathLst>
-            </a:custGeom>
-            <a:solidFill>
-              <a:schemeClr val="dk2"/>
-            </a:solidFill>
-            <a:ln>
-              <a:noFill/>
-            </a:ln>
-          </p:spPr>
-          <p:txBody>
-            <a:bodyPr spcFirstLastPara="1" wrap="square" lIns="93275" tIns="46625" rIns="93275" bIns="46625" anchor="t" anchorCtr="0">
-              <a:noAutofit/>
-            </a:bodyPr>
-            <a:lstStyle/>
-            <a:p>
-              <a:pPr marL="0" marR="0" lvl="0" indent="0" algn="l" rtl="0">
-                <a:lnSpc>
-                  <a:spcPct val="100000"/>
-                </a:lnSpc>
-                <a:spcBef>
-                  <a:spcPts val="0"/>
-                </a:spcBef>
-                <a:spcAft>
-                  <a:spcPts val="0"/>
-                </a:spcAft>
-                <a:buClr>
-                  <a:srgbClr val="000000"/>
-                </a:buClr>
-                <a:buSzPts val="1428"/>
-                <a:buFont typeface="Arial"/>
-                <a:buNone/>
-              </a:pPr>
-              <a:endParaRPr sz="1428" b="0" i="0" u="none" strike="noStrike" cap="none">
-                <a:solidFill>
-                  <a:srgbClr val="000000"/>
-                </a:solidFill>
-                <a:latin typeface="Arial"/>
-                <a:ea typeface="Arial"/>
-                <a:cs typeface="Arial"/>
-                <a:sym typeface="Arial"/>
-              </a:endParaRPr>
-            </a:p>
-          </p:txBody>
-        </p:sp>
-      </p:grpSp>
-      <p:sp>
-        <p:nvSpPr>
-          <p:cNvPr id="77" name="Rectangle 76">
-            <a:extLst>
-              <a:ext uri="{FF2B5EF4-FFF2-40B4-BE49-F238E27FC236}">
-                <a16:creationId xmlns:a16="http://schemas.microsoft.com/office/drawing/2014/main" id="{ED4F8AAB-FCA9-41E0-8545-465B1E5BD83A}"/>
-              </a:ext>
-            </a:extLst>
-          </p:cNvPr>
-          <p:cNvSpPr/>
-          <p:nvPr/>
-        </p:nvSpPr>
-        <p:spPr>
-          <a:xfrm>
-            <a:off x="7284343" y="3092896"/>
-            <a:ext cx="1554857" cy="583322"/>
-          </a:xfrm>
-          <a:prstGeom prst="rect">
-            <a:avLst/>
-          </a:prstGeom>
-          <a:gradFill flip="none" rotWithShape="1">
-            <a:gsLst>
-              <a:gs pos="40000">
-                <a:srgbClr val="0070C0"/>
-              </a:gs>
-              <a:gs pos="99000">
-                <a:srgbClr val="0070C0"/>
-              </a:gs>
-              <a:gs pos="0">
-                <a:srgbClr val="00B0F0"/>
-              </a:gs>
-            </a:gsLst>
-            <a:lin ang="4200000" scaled="0"/>
-            <a:tileRect/>
-          </a:gradFill>
-          <a:ln>
-            <a:solidFill>
-              <a:schemeClr val="accent1">
-                <a:lumMod val="75000"/>
-              </a:schemeClr>
-            </a:solidFill>
-          </a:ln>
-        </p:spPr>
-        <p:style>
-          <a:lnRef idx="1">
-            <a:schemeClr val="accent4"/>
-          </a:lnRef>
-          <a:fillRef idx="3">
-            <a:schemeClr val="accent4"/>
-          </a:fillRef>
-          <a:effectRef idx="2">
-            <a:schemeClr val="accent4"/>
-          </a:effectRef>
-          <a:fontRef idx="minor">
-            <a:schemeClr val="lt1"/>
-          </a:fontRef>
-        </p:style>
-        <p:txBody>
-          <a:bodyPr rtlCol="0" anchor="ctr"/>
-          <a:lstStyle/>
-          <a:p>
-            <a:r>
-              <a:rPr lang="en-US" sz="2000" dirty="0">
-                <a:solidFill>
-                  <a:schemeClr val="bg1"/>
-                </a:solidFill>
-              </a:rPr>
-              <a:t>Unit Variable Cost</a:t>
-            </a:r>
-          </a:p>
-        </p:txBody>
-      </p:sp>
-      <p:sp>
-        <p:nvSpPr>
-          <p:cNvPr id="79" name="Rectangle 78">
-            <a:extLst>
-              <a:ext uri="{FF2B5EF4-FFF2-40B4-BE49-F238E27FC236}">
-                <a16:creationId xmlns:a16="http://schemas.microsoft.com/office/drawing/2014/main" id="{CFF93891-467D-4C64-90F3-D721DA174656}"/>
-              </a:ext>
-            </a:extLst>
-          </p:cNvPr>
-          <p:cNvSpPr/>
-          <p:nvPr/>
-        </p:nvSpPr>
-        <p:spPr>
-          <a:xfrm>
-            <a:off x="431419" y="3676218"/>
-            <a:ext cx="1391264" cy="369332"/>
-          </a:xfrm>
-          <a:prstGeom prst="rect">
-            <a:avLst/>
-          </a:prstGeom>
-          <a:gradFill>
-            <a:gsLst>
-              <a:gs pos="0">
-                <a:schemeClr val="bg1">
-                  <a:lumMod val="85000"/>
-                </a:schemeClr>
-              </a:gs>
-              <a:gs pos="100000">
-                <a:schemeClr val="bg1"/>
-              </a:gs>
-            </a:gsLst>
-          </a:gradFill>
-          <a:ln>
-            <a:solidFill>
-              <a:schemeClr val="bg1">
-                <a:lumMod val="50000"/>
-              </a:schemeClr>
-            </a:solidFill>
-          </a:ln>
-        </p:spPr>
-        <p:style>
-          <a:lnRef idx="1">
-            <a:schemeClr val="accent4"/>
-          </a:lnRef>
-          <a:fillRef idx="3">
-            <a:schemeClr val="accent4"/>
-          </a:fillRef>
-          <a:effectRef idx="2">
-            <a:schemeClr val="accent4"/>
-          </a:effectRef>
-          <a:fontRef idx="minor">
-            <a:schemeClr val="lt1"/>
-          </a:fontRef>
-        </p:style>
-        <p:txBody>
-          <a:bodyPr rtlCol="0" anchor="ctr"/>
-          <a:lstStyle/>
-          <a:p>
-            <a:r>
-              <a:rPr lang="en-US" sz="2000" dirty="0">
-                <a:solidFill>
-                  <a:schemeClr val="tx1">
-                    <a:lumMod val="75000"/>
-                    <a:lumOff val="25000"/>
-                  </a:schemeClr>
-                </a:solidFill>
-              </a:rPr>
-              <a:t>$/ton</a:t>
-            </a:r>
-          </a:p>
-        </p:txBody>
-      </p:sp>
-      <p:sp>
-        <p:nvSpPr>
-          <p:cNvPr id="81" name="Rectangle 80">
-            <a:extLst>
-              <a:ext uri="{FF2B5EF4-FFF2-40B4-BE49-F238E27FC236}">
-                <a16:creationId xmlns:a16="http://schemas.microsoft.com/office/drawing/2014/main" id="{E0D86E1F-8355-478F-825B-473B230A28E5}"/>
-              </a:ext>
-            </a:extLst>
-          </p:cNvPr>
-          <p:cNvSpPr/>
-          <p:nvPr/>
-        </p:nvSpPr>
-        <p:spPr>
-          <a:xfrm>
-            <a:off x="7284343" y="3664214"/>
-            <a:ext cx="1554857" cy="609529"/>
-          </a:xfrm>
-          <a:prstGeom prst="rect">
-            <a:avLst/>
-          </a:prstGeom>
-          <a:gradFill>
-            <a:gsLst>
-              <a:gs pos="0">
-                <a:schemeClr val="bg1">
-                  <a:lumMod val="85000"/>
-                </a:schemeClr>
-              </a:gs>
-              <a:gs pos="100000">
-                <a:schemeClr val="bg1"/>
-              </a:gs>
-            </a:gsLst>
-          </a:gradFill>
-          <a:ln>
-            <a:solidFill>
-              <a:schemeClr val="bg1">
-                <a:lumMod val="50000"/>
-              </a:schemeClr>
-            </a:solidFill>
-          </a:ln>
-        </p:spPr>
-        <p:style>
-          <a:lnRef idx="1">
-            <a:schemeClr val="accent4"/>
-          </a:lnRef>
-          <a:fillRef idx="3">
-            <a:schemeClr val="accent4"/>
-          </a:fillRef>
-          <a:effectRef idx="2">
-            <a:schemeClr val="accent4"/>
-          </a:effectRef>
-          <a:fontRef idx="minor">
-            <a:schemeClr val="lt1"/>
-          </a:fontRef>
-        </p:style>
-        <p:txBody>
-          <a:bodyPr rtlCol="0" anchor="ctr"/>
-          <a:lstStyle/>
-          <a:p>
-            <a:r>
-              <a:rPr lang="en-US" sz="2000" dirty="0">
-                <a:solidFill>
-                  <a:schemeClr val="tx1">
-                    <a:lumMod val="75000"/>
-                    <a:lumOff val="25000"/>
-                  </a:schemeClr>
-                </a:solidFill>
-              </a:rPr>
-              <a:t>$ per Unit</a:t>
-            </a:r>
-          </a:p>
-        </p:txBody>
-      </p:sp>
-      <p:sp>
-        <p:nvSpPr>
-          <p:cNvPr id="85" name="Rectangle 84">
-            <a:extLst>
-              <a:ext uri="{FF2B5EF4-FFF2-40B4-BE49-F238E27FC236}">
-                <a16:creationId xmlns:a16="http://schemas.microsoft.com/office/drawing/2014/main" id="{4CA3D87C-E211-4F3D-9BB8-7AE5FEB68BF7}"/>
-              </a:ext>
-            </a:extLst>
-          </p:cNvPr>
-          <p:cNvSpPr/>
-          <p:nvPr/>
-        </p:nvSpPr>
-        <p:spPr>
-          <a:xfrm>
-            <a:off x="7284343" y="4765876"/>
-            <a:ext cx="1554857" cy="583322"/>
-          </a:xfrm>
-          <a:prstGeom prst="rect">
-            <a:avLst/>
-          </a:prstGeom>
-          <a:gradFill flip="none" rotWithShape="1">
-            <a:gsLst>
-              <a:gs pos="40000">
-                <a:srgbClr val="0070C0"/>
-              </a:gs>
-              <a:gs pos="99000">
-                <a:srgbClr val="0070C0"/>
-              </a:gs>
-              <a:gs pos="0">
-                <a:srgbClr val="00B0F0"/>
-              </a:gs>
-            </a:gsLst>
-            <a:lin ang="4200000" scaled="0"/>
-            <a:tileRect/>
-          </a:gradFill>
-          <a:ln>
-            <a:solidFill>
-              <a:schemeClr val="accent1">
-                <a:lumMod val="75000"/>
-              </a:schemeClr>
-            </a:solidFill>
-          </a:ln>
-        </p:spPr>
-        <p:style>
-          <a:lnRef idx="1">
-            <a:schemeClr val="accent4"/>
-          </a:lnRef>
-          <a:fillRef idx="3">
-            <a:schemeClr val="accent4"/>
-          </a:fillRef>
-          <a:effectRef idx="2">
-            <a:schemeClr val="accent4"/>
-          </a:effectRef>
-          <a:fontRef idx="minor">
-            <a:schemeClr val="lt1"/>
-          </a:fontRef>
-        </p:style>
-        <p:txBody>
-          <a:bodyPr rtlCol="0" anchor="ctr"/>
-          <a:lstStyle/>
-          <a:p>
-            <a:r>
-              <a:rPr lang="en-US" sz="2000" dirty="0">
-                <a:solidFill>
-                  <a:schemeClr val="bg1"/>
-                </a:solidFill>
-              </a:rPr>
-              <a:t># of Units</a:t>
-            </a:r>
-          </a:p>
-        </p:txBody>
-      </p:sp>
-      <p:sp>
-        <p:nvSpPr>
-          <p:cNvPr id="87" name="Rectangle 86">
-            <a:extLst>
-              <a:ext uri="{FF2B5EF4-FFF2-40B4-BE49-F238E27FC236}">
-                <a16:creationId xmlns:a16="http://schemas.microsoft.com/office/drawing/2014/main" id="{C3D25EED-40FE-4058-B6EA-5D11DFEFF125}"/>
-              </a:ext>
-            </a:extLst>
-          </p:cNvPr>
-          <p:cNvSpPr/>
-          <p:nvPr/>
-        </p:nvSpPr>
-        <p:spPr>
-          <a:xfrm>
-            <a:off x="7284343" y="5340297"/>
-            <a:ext cx="1554857" cy="609529"/>
-          </a:xfrm>
-          <a:prstGeom prst="rect">
-            <a:avLst/>
-          </a:prstGeom>
-          <a:gradFill>
-            <a:gsLst>
-              <a:gs pos="0">
-                <a:schemeClr val="bg1">
-                  <a:lumMod val="85000"/>
-                </a:schemeClr>
-              </a:gs>
-              <a:gs pos="100000">
-                <a:schemeClr val="bg1"/>
-              </a:gs>
-            </a:gsLst>
-          </a:gradFill>
-          <a:ln>
-            <a:solidFill>
-              <a:schemeClr val="bg1">
-                <a:lumMod val="50000"/>
-              </a:schemeClr>
-            </a:solidFill>
-          </a:ln>
-        </p:spPr>
-        <p:style>
-          <a:lnRef idx="1">
-            <a:schemeClr val="accent4"/>
-          </a:lnRef>
-          <a:fillRef idx="3">
-            <a:schemeClr val="accent4"/>
-          </a:fillRef>
-          <a:effectRef idx="2">
-            <a:schemeClr val="accent4"/>
-          </a:effectRef>
-          <a:fontRef idx="minor">
-            <a:schemeClr val="lt1"/>
-          </a:fontRef>
-        </p:style>
-        <p:txBody>
-          <a:bodyPr rtlCol="0" anchor="ctr"/>
-          <a:lstStyle/>
-          <a:p>
-            <a:r>
-              <a:rPr lang="en-US" sz="2000" dirty="0">
-                <a:solidFill>
-                  <a:schemeClr val="tx1">
-                    <a:lumMod val="75000"/>
-                    <a:lumOff val="25000"/>
-                  </a:schemeClr>
-                </a:solidFill>
-              </a:rPr>
-              <a:t># of Units</a:t>
-            </a:r>
-          </a:p>
-        </p:txBody>
-      </p:sp>
-      <p:cxnSp>
-        <p:nvCxnSpPr>
-          <p:cNvPr id="89" name="Connector: Elbow 88">
-            <a:extLst>
-              <a:ext uri="{FF2B5EF4-FFF2-40B4-BE49-F238E27FC236}">
-                <a16:creationId xmlns:a16="http://schemas.microsoft.com/office/drawing/2014/main" id="{62FB6616-4621-4607-8659-543AB8B094BC}"/>
-              </a:ext>
-            </a:extLst>
-          </p:cNvPr>
-          <p:cNvCxnSpPr>
-            <a:cxnSpLocks/>
-            <a:stCxn id="23" idx="3"/>
-            <a:endCxn id="77" idx="1"/>
-          </p:cNvCxnSpPr>
-          <p:nvPr/>
-        </p:nvCxnSpPr>
-        <p:spPr>
-          <a:xfrm flipV="1">
-            <a:off x="6684638" y="3384557"/>
-            <a:ext cx="599705" cy="397053"/>
-          </a:xfrm>
-          <a:prstGeom prst="bentConnector3">
-            <a:avLst/>
-          </a:prstGeom>
-        </p:spPr>
-        <p:style>
-          <a:lnRef idx="1">
-            <a:schemeClr val="accent1"/>
-          </a:lnRef>
-          <a:fillRef idx="0">
-            <a:schemeClr val="accent1"/>
-          </a:fillRef>
-          <a:effectRef idx="0">
-            <a:schemeClr val="accent1"/>
-          </a:effectRef>
-          <a:fontRef idx="minor">
-            <a:schemeClr val="tx1"/>
-          </a:fontRef>
-        </p:style>
-      </p:cxnSp>
-      <p:cxnSp>
-        <p:nvCxnSpPr>
-          <p:cNvPr id="93" name="Connector: Elbow 92">
-            <a:extLst>
-              <a:ext uri="{FF2B5EF4-FFF2-40B4-BE49-F238E27FC236}">
-                <a16:creationId xmlns:a16="http://schemas.microsoft.com/office/drawing/2014/main" id="{76AB3B0B-3ABF-4948-8C1E-9E448D98299D}"/>
-              </a:ext>
-            </a:extLst>
-          </p:cNvPr>
-          <p:cNvCxnSpPr>
-            <a:cxnSpLocks/>
-            <a:stCxn id="85" idx="1"/>
-            <a:endCxn id="23" idx="3"/>
-          </p:cNvCxnSpPr>
-          <p:nvPr/>
-        </p:nvCxnSpPr>
-        <p:spPr>
-          <a:xfrm rot="10800000">
-            <a:off x="6684639" y="3781611"/>
-            <a:ext cx="599705" cy="1275927"/>
-          </a:xfrm>
-          <a:prstGeom prst="bentConnector3">
-            <a:avLst>
-              <a:gd name="adj1" fmla="val 50000"/>
-            </a:avLst>
-          </a:prstGeom>
-        </p:spPr>
-        <p:style>
-          <a:lnRef idx="1">
-            <a:schemeClr val="accent1"/>
-          </a:lnRef>
-          <a:fillRef idx="0">
-            <a:schemeClr val="accent1"/>
-          </a:fillRef>
-          <a:effectRef idx="0">
-            <a:schemeClr val="accent1"/>
-          </a:effectRef>
-          <a:fontRef idx="minor">
-            <a:schemeClr val="tx1"/>
-          </a:fontRef>
-        </p:style>
-      </p:cxnSp>
-      <p:grpSp>
-        <p:nvGrpSpPr>
-          <p:cNvPr id="106" name="Google Shape;39;p1">
-            <a:extLst>
-              <a:ext uri="{FF2B5EF4-FFF2-40B4-BE49-F238E27FC236}">
-                <a16:creationId xmlns:a16="http://schemas.microsoft.com/office/drawing/2014/main" id="{D9816210-378E-4C56-AE8D-276F193340B1}"/>
-              </a:ext>
-            </a:extLst>
-          </p:cNvPr>
-          <p:cNvGrpSpPr/>
-          <p:nvPr/>
-        </p:nvGrpSpPr>
-        <p:grpSpPr>
-          <a:xfrm rot="2796882">
-            <a:off x="6821049" y="3646520"/>
-            <a:ext cx="326880" cy="332266"/>
-            <a:chOff x="4283114" y="-597224"/>
-            <a:chExt cx="170332" cy="170332"/>
-          </a:xfrm>
-        </p:grpSpPr>
-        <p:sp>
-          <p:nvSpPr>
-            <p:cNvPr id="107" name="Google Shape;40;p1">
-              <a:extLst>
-                <a:ext uri="{FF2B5EF4-FFF2-40B4-BE49-F238E27FC236}">
-                  <a16:creationId xmlns:a16="http://schemas.microsoft.com/office/drawing/2014/main" id="{9CDF85A6-ACFF-49E3-9C13-26CB6DB40AEF}"/>
-                </a:ext>
-              </a:extLst>
-            </p:cNvPr>
-            <p:cNvSpPr/>
-            <p:nvPr/>
-          </p:nvSpPr>
-          <p:spPr>
-            <a:xfrm>
-              <a:off x="4283114" y="-597224"/>
-              <a:ext cx="170332" cy="170332"/>
-            </a:xfrm>
-            <a:prstGeom prst="ellipse">
-              <a:avLst/>
-            </a:prstGeom>
-            <a:solidFill>
-              <a:schemeClr val="accent3"/>
-            </a:solidFill>
-            <a:ln w="12700" cap="flat" cmpd="sng">
-              <a:solidFill>
-                <a:schemeClr val="lt1"/>
-              </a:solidFill>
-              <a:prstDash val="solid"/>
-              <a:round/>
-              <a:headEnd type="none" w="sm" len="sm"/>
-              <a:tailEnd type="none" w="sm" len="sm"/>
-            </a:ln>
-          </p:spPr>
-          <p:txBody>
-            <a:bodyPr spcFirstLastPara="1" wrap="square" lIns="91425" tIns="45700" rIns="91425" bIns="45700" anchor="ctr" anchorCtr="0">
-              <a:noAutofit/>
-            </a:bodyPr>
-            <a:lstStyle/>
-            <a:p>
-              <a:pPr marL="0" marR="0" lvl="0" indent="0" algn="l" rtl="0">
-                <a:lnSpc>
-                  <a:spcPct val="100000"/>
-                </a:lnSpc>
-                <a:spcBef>
-                  <a:spcPts val="0"/>
-                </a:spcBef>
-                <a:spcAft>
-                  <a:spcPts val="0"/>
-                </a:spcAft>
-                <a:buClr>
-                  <a:srgbClr val="000000"/>
-                </a:buClr>
-                <a:buSzPts val="1428"/>
-                <a:buFont typeface="Arial"/>
-                <a:buNone/>
-              </a:pPr>
-              <a:endParaRPr sz="1428" b="1" i="0" u="none" strike="noStrike" cap="none">
-                <a:solidFill>
-                  <a:srgbClr val="000000"/>
-                </a:solidFill>
-                <a:latin typeface="Arial"/>
-                <a:ea typeface="Arial"/>
-                <a:cs typeface="Arial"/>
-                <a:sym typeface="Arial"/>
-              </a:endParaRPr>
-            </a:p>
-          </p:txBody>
-        </p:sp>
-        <p:sp>
-          <p:nvSpPr>
-            <p:cNvPr id="108" name="Google Shape;41;p1">
-              <a:extLst>
-                <a:ext uri="{FF2B5EF4-FFF2-40B4-BE49-F238E27FC236}">
-                  <a16:creationId xmlns:a16="http://schemas.microsoft.com/office/drawing/2014/main" id="{1DE77302-EFCE-4D2A-9A7C-51695FC15404}"/>
+                  <a16:creationId xmlns:a16="http://schemas.microsoft.com/office/drawing/2014/main" id="{09DC5F3F-3D1A-41C6-A21F-576213EBF64B}"/>
                 </a:ext>
               </a:extLst>
             </p:cNvPr>
@@ -5536,10 +5877,10 @@
       </p:grpSp>
       <p:sp>
         <p:nvSpPr>
-          <p:cNvPr id="115" name="Rectangle 114">
+          <p:cNvPr id="100" name="Google Shape;40;p1">
             <a:extLst>
               <a:ext uri="{FF2B5EF4-FFF2-40B4-BE49-F238E27FC236}">
-                <a16:creationId xmlns:a16="http://schemas.microsoft.com/office/drawing/2014/main" id="{431DB27A-415A-47E7-B82D-B53ED64E4C2F}"/>
+                <a16:creationId xmlns:a16="http://schemas.microsoft.com/office/drawing/2014/main" id="{2833ADA7-7748-442A-ADDB-04EA715EBF2D}"/>
               </a:ext>
             </a:extLst>
           </p:cNvPr>
@@ -5547,9 +5888,89 @@
           <p:nvPr/>
         </p:nvSpPr>
         <p:spPr>
+          <a:xfrm rot="5400000">
+            <a:off x="1613251" y="3203359"/>
+            <a:ext cx="326880" cy="332266"/>
+          </a:xfrm>
+          <a:prstGeom prst="ellipse">
+            <a:avLst/>
+          </a:prstGeom>
+          <a:solidFill>
+            <a:schemeClr val="accent3"/>
+          </a:solidFill>
+          <a:ln w="12700" cap="flat" cmpd="sng">
+            <a:solidFill>
+              <a:schemeClr val="lt1"/>
+            </a:solidFill>
+            <a:prstDash val="solid"/>
+            <a:round/>
+            <a:headEnd type="none" w="sm" len="sm"/>
+            <a:tailEnd type="none" w="sm" len="sm"/>
+          </a:ln>
+        </p:spPr>
+        <p:txBody>
+          <a:bodyPr spcFirstLastPara="1" wrap="square" lIns="91425" tIns="45700" rIns="91425" bIns="45700" anchor="ctr" anchorCtr="0">
+            <a:noAutofit/>
+          </a:bodyPr>
+          <a:lstStyle/>
+          <a:p>
+            <a:pPr marL="0" marR="0" lvl="0" indent="0" algn="l" rtl="0">
+              <a:lnSpc>
+                <a:spcPct val="100000"/>
+              </a:lnSpc>
+              <a:spcBef>
+                <a:spcPts val="0"/>
+              </a:spcBef>
+              <a:spcAft>
+                <a:spcPts val="0"/>
+              </a:spcAft>
+              <a:buClr>
+                <a:srgbClr val="000000"/>
+              </a:buClr>
+              <a:buSzPts val="1428"/>
+              <a:buFont typeface="Arial"/>
+              <a:buNone/>
+            </a:pPr>
+            <a:r>
+              <a:rPr lang="en-US" b="1" i="0" u="none" strike="noStrike" cap="none" dirty="0">
+                <a:solidFill>
+                  <a:srgbClr val="FF0000"/>
+                </a:solidFill>
+                <a:latin typeface="Arial"/>
+                <a:ea typeface="Arial"/>
+                <a:cs typeface="Arial"/>
+                <a:sym typeface="Arial"/>
+              </a:rPr>
+              <a:t>|</a:t>
+            </a:r>
+            <a:endParaRPr b="1" i="0" u="none" strike="noStrike" cap="none" dirty="0">
+              <a:solidFill>
+                <a:srgbClr val="FF0000"/>
+              </a:solidFill>
+              <a:latin typeface="Arial"/>
+              <a:ea typeface="Arial"/>
+              <a:cs typeface="Arial"/>
+              <a:sym typeface="Arial"/>
+            </a:endParaRPr>
+          </a:p>
+        </p:txBody>
+      </p:sp>
+      <p:sp>
+        <p:nvSpPr>
+          <p:cNvPr id="104" name="Rectangle 103">
+            <a:extLst>
+              <a:ext uri="{FF2B5EF4-FFF2-40B4-BE49-F238E27FC236}">
+                <a16:creationId xmlns:a16="http://schemas.microsoft.com/office/drawing/2014/main" id="{9DA22F61-0260-4374-AE90-3AD06592C562}"/>
+              </a:ext>
+            </a:extLst>
+          </p:cNvPr>
+          <p:cNvSpPr/>
+          <p:nvPr/>
+        </p:nvSpPr>
+        <p:spPr>
           <a:xfrm>
-            <a:off x="4950154" y="4863482"/>
-            <a:ext cx="1554857" cy="476815"/>
+            <a:off x="6699817" y="4951226"/>
+            <a:ext cx="1387031" cy="398966"/>
           </a:xfrm>
           <a:prstGeom prst="rect">
             <a:avLst/>
@@ -5601,17 +6022,17 @@
                   <a:schemeClr val="bg1"/>
                 </a:solidFill>
               </a:rPr>
-              <a:t>Mining Rate</a:t>
-            </a:r>
-          </a:p>
-        </p:txBody>
-      </p:sp>
-      <p:sp>
-        <p:nvSpPr>
-          <p:cNvPr id="117" name="Rectangle 116">
+              <a:t>Rent</a:t>
+            </a:r>
+          </a:p>
+        </p:txBody>
+      </p:sp>
+      <p:sp>
+        <p:nvSpPr>
+          <p:cNvPr id="105" name="Rectangle 104">
             <a:extLst>
               <a:ext uri="{FF2B5EF4-FFF2-40B4-BE49-F238E27FC236}">
-                <a16:creationId xmlns:a16="http://schemas.microsoft.com/office/drawing/2014/main" id="{56E2DB27-4B88-4244-A08A-E0AAC2C1DA32}"/>
+                <a16:creationId xmlns:a16="http://schemas.microsoft.com/office/drawing/2014/main" id="{3CE59173-3143-4CC9-AD1E-5D3F1D769344}"/>
               </a:ext>
             </a:extLst>
           </p:cNvPr>
@@ -5620,80 +6041,8 @@
         </p:nvSpPr>
         <p:spPr>
           <a:xfrm>
-            <a:off x="4950154" y="5349198"/>
-            <a:ext cx="1554857" cy="347107"/>
-          </a:xfrm>
-          <a:prstGeom prst="rect">
-            <a:avLst/>
-          </a:prstGeom>
-          <a:gradFill>
-            <a:gsLst>
-              <a:gs pos="0">
-                <a:schemeClr val="bg1">
-                  <a:lumMod val="85000"/>
-                </a:schemeClr>
-              </a:gs>
-              <a:gs pos="100000">
-                <a:schemeClr val="bg1"/>
-              </a:gs>
-            </a:gsLst>
-          </a:gradFill>
-          <a:ln>
-            <a:solidFill>
-              <a:schemeClr val="bg1">
-                <a:lumMod val="50000"/>
-              </a:schemeClr>
-            </a:solidFill>
-          </a:ln>
-        </p:spPr>
-        <p:style>
-          <a:lnRef idx="1">
-            <a:schemeClr val="accent4"/>
-          </a:lnRef>
-          <a:fillRef idx="3">
-            <a:schemeClr val="accent4"/>
-          </a:fillRef>
-          <a:effectRef idx="2">
-            <a:schemeClr val="accent4"/>
-          </a:effectRef>
-          <a:fontRef idx="minor">
-            <a:schemeClr val="lt1"/>
-          </a:fontRef>
-        </p:style>
-        <p:txBody>
-          <a:bodyPr rtlCol="0" anchor="ctr"/>
-          <a:lstStyle/>
-          <a:p>
-            <a:r>
-              <a:rPr lang="en-US" sz="2000" dirty="0">
-                <a:solidFill>
-                  <a:schemeClr val="tx1">
-                    <a:lumMod val="75000"/>
-                    <a:lumOff val="25000"/>
-                  </a:schemeClr>
-                </a:solidFill>
-              </a:rPr>
-              <a:t>ton/hour</a:t>
-            </a:r>
-          </a:p>
-        </p:txBody>
-      </p:sp>
-      <p:sp>
-        <p:nvSpPr>
-          <p:cNvPr id="119" name="Rectangle 118">
-            <a:extLst>
-              <a:ext uri="{FF2B5EF4-FFF2-40B4-BE49-F238E27FC236}">
-                <a16:creationId xmlns:a16="http://schemas.microsoft.com/office/drawing/2014/main" id="{00037402-911C-48F7-B9AE-873726F38C8A}"/>
-              </a:ext>
-            </a:extLst>
-          </p:cNvPr>
-          <p:cNvSpPr/>
-          <p:nvPr/>
-        </p:nvSpPr>
-        <p:spPr>
-          <a:xfrm>
-            <a:off x="4950154" y="5755198"/>
-            <a:ext cx="1554857" cy="476815"/>
+            <a:off x="6707699" y="5872682"/>
+            <a:ext cx="1387031" cy="398966"/>
           </a:xfrm>
           <a:prstGeom prst="rect">
             <a:avLst/>
@@ -5745,17 +6094,17 @@
                   <a:schemeClr val="bg1"/>
                 </a:solidFill>
               </a:rPr>
-              <a:t># of Hours</a:t>
-            </a:r>
-          </a:p>
-        </p:txBody>
-      </p:sp>
-      <p:sp>
-        <p:nvSpPr>
-          <p:cNvPr id="121" name="Rectangle 120">
+              <a:t>Insurance</a:t>
+            </a:r>
+          </a:p>
+        </p:txBody>
+      </p:sp>
+      <p:sp>
+        <p:nvSpPr>
+          <p:cNvPr id="109" name="Rectangle 108">
             <a:extLst>
               <a:ext uri="{FF2B5EF4-FFF2-40B4-BE49-F238E27FC236}">
-                <a16:creationId xmlns:a16="http://schemas.microsoft.com/office/drawing/2014/main" id="{58EB6BB0-05E2-4647-9B88-7C2217449052}"/>
+                <a16:creationId xmlns:a16="http://schemas.microsoft.com/office/drawing/2014/main" id="{61903ECB-A969-4B02-A0BB-E96C2BCEFCE1}"/>
               </a:ext>
             </a:extLst>
           </p:cNvPr>
@@ -5764,8 +6113,8 @@
         </p:nvSpPr>
         <p:spPr>
           <a:xfrm>
-            <a:off x="4955361" y="6210798"/>
-            <a:ext cx="1554857" cy="347107"/>
+            <a:off x="6699816" y="5368108"/>
+            <a:ext cx="1387031" cy="366535"/>
           </a:xfrm>
           <a:prstGeom prst="rect">
             <a:avLst/>
@@ -5817,30 +6166,102 @@
                   </a:schemeClr>
                 </a:solidFill>
               </a:rPr>
-              <a:t>hour</a:t>
+              <a:t>$</a:t>
+            </a:r>
+          </a:p>
+        </p:txBody>
+      </p:sp>
+      <p:sp>
+        <p:nvSpPr>
+          <p:cNvPr id="110" name="Rectangle 109">
+            <a:extLst>
+              <a:ext uri="{FF2B5EF4-FFF2-40B4-BE49-F238E27FC236}">
+                <a16:creationId xmlns:a16="http://schemas.microsoft.com/office/drawing/2014/main" id="{012CBD84-1066-4726-B7B3-81E0D5A8C0AA}"/>
+              </a:ext>
+            </a:extLst>
+          </p:cNvPr>
+          <p:cNvSpPr/>
+          <p:nvPr/>
+        </p:nvSpPr>
+        <p:spPr>
+          <a:xfrm>
+            <a:off x="6699816" y="6271648"/>
+            <a:ext cx="1387031" cy="372370"/>
+          </a:xfrm>
+          <a:prstGeom prst="rect">
+            <a:avLst/>
+          </a:prstGeom>
+          <a:gradFill>
+            <a:gsLst>
+              <a:gs pos="0">
+                <a:schemeClr val="bg1">
+                  <a:lumMod val="85000"/>
+                </a:schemeClr>
+              </a:gs>
+              <a:gs pos="100000">
+                <a:schemeClr val="bg1"/>
+              </a:gs>
+            </a:gsLst>
+          </a:gradFill>
+          <a:ln>
+            <a:solidFill>
+              <a:schemeClr val="bg1">
+                <a:lumMod val="50000"/>
+              </a:schemeClr>
+            </a:solidFill>
+          </a:ln>
+        </p:spPr>
+        <p:style>
+          <a:lnRef idx="1">
+            <a:schemeClr val="accent4"/>
+          </a:lnRef>
+          <a:fillRef idx="3">
+            <a:schemeClr val="accent4"/>
+          </a:fillRef>
+          <a:effectRef idx="2">
+            <a:schemeClr val="accent4"/>
+          </a:effectRef>
+          <a:fontRef idx="minor">
+            <a:schemeClr val="lt1"/>
+          </a:fontRef>
+        </p:style>
+        <p:txBody>
+          <a:bodyPr rtlCol="0" anchor="ctr"/>
+          <a:lstStyle/>
+          <a:p>
+            <a:r>
+              <a:rPr lang="en-US" sz="2000" dirty="0">
+                <a:solidFill>
+                  <a:schemeClr val="tx1">
+                    <a:lumMod val="75000"/>
+                    <a:lumOff val="25000"/>
+                  </a:schemeClr>
+                </a:solidFill>
+              </a:rPr>
+              <a:t>$</a:t>
             </a:r>
           </a:p>
         </p:txBody>
       </p:sp>
       <p:cxnSp>
         <p:nvCxnSpPr>
-          <p:cNvPr id="123" name="Connector: Elbow 122">
+          <p:cNvPr id="71" name="Connector: Elbow 70">
             <a:extLst>
               <a:ext uri="{FF2B5EF4-FFF2-40B4-BE49-F238E27FC236}">
-                <a16:creationId xmlns:a16="http://schemas.microsoft.com/office/drawing/2014/main" id="{1ECED875-1F13-43CE-A224-ABA9CE4402FB}"/>
+                <a16:creationId xmlns:a16="http://schemas.microsoft.com/office/drawing/2014/main" id="{6AA6D5BC-EF2A-4095-AAD3-578CAD5BABCB}"/>
               </a:ext>
             </a:extLst>
           </p:cNvPr>
           <p:cNvCxnSpPr>
-            <a:stCxn id="5" idx="3"/>
-            <a:endCxn id="115" idx="1"/>
+            <a:stCxn id="24" idx="3"/>
+            <a:endCxn id="104" idx="1"/>
           </p:cNvCxnSpPr>
           <p:nvPr/>
         </p:nvCxnSpPr>
         <p:spPr>
           <a:xfrm flipV="1">
-            <a:off x="4085303" y="5101890"/>
-            <a:ext cx="864851" cy="583108"/>
+            <a:off x="5791200" y="5150709"/>
+            <a:ext cx="908617" cy="553361"/>
           </a:xfrm>
           <a:prstGeom prst="bentConnector3">
             <a:avLst/>
@@ -5848,13 +6269,13 @@
         </p:spPr>
         <p:style>
           <a:lnRef idx="1">
-            <a:schemeClr val="accent1"/>
+            <a:schemeClr val="dk1"/>
           </a:lnRef>
           <a:fillRef idx="0">
-            <a:schemeClr val="accent1"/>
+            <a:schemeClr val="dk1"/>
           </a:fillRef>
           <a:effectRef idx="0">
-            <a:schemeClr val="accent1"/>
+            <a:schemeClr val="dk1"/>
           </a:effectRef>
           <a:fontRef idx="minor">
             <a:schemeClr val="tx1"/>
@@ -5863,24 +6284,23 @@
       </p:cxnSp>
       <p:cxnSp>
         <p:nvCxnSpPr>
-          <p:cNvPr id="125" name="Connector: Elbow 124">
+          <p:cNvPr id="78" name="Connector: Elbow 77">
             <a:extLst>
               <a:ext uri="{FF2B5EF4-FFF2-40B4-BE49-F238E27FC236}">
-                <a16:creationId xmlns:a16="http://schemas.microsoft.com/office/drawing/2014/main" id="{42B96EBD-2B89-4BA6-8086-1EF97454311B}"/>
+                <a16:creationId xmlns:a16="http://schemas.microsoft.com/office/drawing/2014/main" id="{B3BF7C50-AF2A-47C8-8602-06FA04844AF3}"/>
               </a:ext>
             </a:extLst>
           </p:cNvPr>
           <p:cNvCxnSpPr>
-            <a:cxnSpLocks/>
-            <a:stCxn id="5" idx="3"/>
-            <a:endCxn id="119" idx="1"/>
+            <a:stCxn id="24" idx="3"/>
+            <a:endCxn id="105" idx="1"/>
           </p:cNvCxnSpPr>
           <p:nvPr/>
         </p:nvCxnSpPr>
         <p:spPr>
           <a:xfrm>
-            <a:off x="4085303" y="5684998"/>
-            <a:ext cx="864851" cy="308608"/>
+            <a:off x="5791200" y="5704070"/>
+            <a:ext cx="916499" cy="368095"/>
           </a:xfrm>
           <a:prstGeom prst="bentConnector3">
             <a:avLst/>
@@ -5903,10 +6323,10 @@
       </p:cxnSp>
       <p:grpSp>
         <p:nvGrpSpPr>
-          <p:cNvPr id="127" name="Google Shape;39;p1">
+          <p:cNvPr id="114" name="Google Shape;39;p1">
             <a:extLst>
               <a:ext uri="{FF2B5EF4-FFF2-40B4-BE49-F238E27FC236}">
-                <a16:creationId xmlns:a16="http://schemas.microsoft.com/office/drawing/2014/main" id="{A4606711-9205-4620-B92E-3AB3BC903F89}"/>
+                <a16:creationId xmlns:a16="http://schemas.microsoft.com/office/drawing/2014/main" id="{156DDECE-06C7-4874-880E-92E38548F650}"/>
               </a:ext>
             </a:extLst>
           </p:cNvPr>
@@ -5914,8 +6334,8 @@
           <p:nvPr/>
         </p:nvGrpSpPr>
         <p:grpSpPr>
-          <a:xfrm rot="2796882">
-            <a:off x="4354289" y="5516310"/>
+          <a:xfrm rot="5400000">
+            <a:off x="6078317" y="5535567"/>
             <a:ext cx="326880" cy="332266"/>
             <a:chOff x="4283114" y="-597224"/>
             <a:chExt cx="170332" cy="170332"/>
@@ -5923,10 +6343,10 @@
         </p:grpSpPr>
         <p:sp>
           <p:nvSpPr>
-            <p:cNvPr id="128" name="Google Shape;40;p1">
+            <p:cNvPr id="116" name="Google Shape;40;p1">
               <a:extLst>
                 <a:ext uri="{FF2B5EF4-FFF2-40B4-BE49-F238E27FC236}">
-                  <a16:creationId xmlns:a16="http://schemas.microsoft.com/office/drawing/2014/main" id="{3910E01F-C43D-4817-9E84-B46D70AC97DE}"/>
+                  <a16:creationId xmlns:a16="http://schemas.microsoft.com/office/drawing/2014/main" id="{EE8C3974-5719-4B82-AD04-2FFC5BA4C7DD}"/>
                 </a:ext>
               </a:extLst>
             </p:cNvPr>
@@ -5991,10 +6411,10 @@
         </p:sp>
         <p:sp>
           <p:nvSpPr>
-            <p:cNvPr id="129" name="Google Shape;41;p1">
+            <p:cNvPr id="118" name="Google Shape;41;p1">
               <a:extLst>
                 <a:ext uri="{FF2B5EF4-FFF2-40B4-BE49-F238E27FC236}">
-                  <a16:creationId xmlns:a16="http://schemas.microsoft.com/office/drawing/2014/main" id="{42762AFA-54DB-4B6E-9D26-BCDA81054CEE}"/>
+                  <a16:creationId xmlns:a16="http://schemas.microsoft.com/office/drawing/2014/main" id="{33379DFC-3B42-4B2C-929B-CE5EDACEE0DB}"/>
                 </a:ext>
               </a:extLst>
             </p:cNvPr>

</xml_diff>